<commit_message>
update file report & add slide report
</commit_message>
<xml_diff>
--- a/Python_ML/Report/Slide - Bao Cao Cuoi Ki - Python.pptx
+++ b/Python_ML/Report/Slide - Bao Cao Cuoi Ki - Python.pptx
@@ -5,7 +5,7 @@
     <p:sldMasterId id="2147483660" r:id="rId4"/>
   </p:sldMasterIdLst>
   <p:notesMasterIdLst>
-    <p:notesMasterId r:id="rId23"/>
+    <p:notesMasterId r:id="rId21"/>
   </p:notesMasterIdLst>
   <p:sldIdLst>
     <p:sldId id="456" r:id="rId5"/>
@@ -15,17 +15,15 @@
     <p:sldId id="610" r:id="rId9"/>
     <p:sldId id="625" r:id="rId10"/>
     <p:sldId id="619" r:id="rId11"/>
-    <p:sldId id="626" r:id="rId12"/>
-    <p:sldId id="627" r:id="rId13"/>
+    <p:sldId id="627" r:id="rId12"/>
+    <p:sldId id="626" r:id="rId13"/>
     <p:sldId id="628" r:id="rId14"/>
-    <p:sldId id="629" r:id="rId15"/>
-    <p:sldId id="630" r:id="rId16"/>
-    <p:sldId id="621" r:id="rId17"/>
-    <p:sldId id="620" r:id="rId18"/>
-    <p:sldId id="622" r:id="rId19"/>
-    <p:sldId id="623" r:id="rId20"/>
-    <p:sldId id="631" r:id="rId21"/>
-    <p:sldId id="587" r:id="rId22"/>
+    <p:sldId id="630" r:id="rId15"/>
+    <p:sldId id="620" r:id="rId16"/>
+    <p:sldId id="622" r:id="rId17"/>
+    <p:sldId id="623" r:id="rId18"/>
+    <p:sldId id="631" r:id="rId19"/>
+    <p:sldId id="587" r:id="rId20"/>
   </p:sldIdLst>
   <p:sldSz cx="9144000" cy="6858000" type="screen4x3"/>
   <p:notesSz cx="6858000" cy="9144000"/>
@@ -1256,7 +1254,7 @@
           <p:cNvPr id="9" name="Google Shape;105;p1">
             <a:extLst>
               <a:ext uri="{FF2B5EF4-FFF2-40B4-BE49-F238E27FC236}">
-                <a16:creationId xmlns:a16="http://schemas.microsoft.com/office/drawing/2014/main" xmlns="" id="{E9C428B9-BD3B-47CF-96EB-8E8024AAE980}"/>
+                <a16:creationId xmlns="" xmlns:a16="http://schemas.microsoft.com/office/drawing/2014/main" id="{E9C428B9-BD3B-47CF-96EB-8E8024AAE980}"/>
               </a:ext>
             </a:extLst>
           </p:cNvPr>
@@ -1316,7 +1314,7 @@
           <p:cNvPr id="15" name="Google Shape;109;p1">
             <a:extLst>
               <a:ext uri="{FF2B5EF4-FFF2-40B4-BE49-F238E27FC236}">
-                <a16:creationId xmlns:a16="http://schemas.microsoft.com/office/drawing/2014/main" xmlns="" id="{91E4D465-1973-499C-87CE-5A38A4FE5280}"/>
+                <a16:creationId xmlns="" xmlns:a16="http://schemas.microsoft.com/office/drawing/2014/main" id="{91E4D465-1973-499C-87CE-5A38A4FE5280}"/>
               </a:ext>
             </a:extLst>
           </p:cNvPr>
@@ -1367,7 +1365,7 @@
           <p:cNvPr id="13" name="Google Shape;109;p1">
             <a:extLst>
               <a:ext uri="{FF2B5EF4-FFF2-40B4-BE49-F238E27FC236}">
-                <a16:creationId xmlns:a16="http://schemas.microsoft.com/office/drawing/2014/main" xmlns="" id="{16772B44-7759-405B-9C67-35948DD5766F}"/>
+                <a16:creationId xmlns="" xmlns:a16="http://schemas.microsoft.com/office/drawing/2014/main" id="{16772B44-7759-405B-9C67-35948DD5766F}"/>
               </a:ext>
             </a:extLst>
           </p:cNvPr>
@@ -1583,7 +1581,7 @@
           <p:cNvPr id="10" name="Picture 9" descr="A picture containing object, clock&#10;&#10;Description automatically generated">
             <a:extLst>
               <a:ext uri="{FF2B5EF4-FFF2-40B4-BE49-F238E27FC236}">
-                <a16:creationId xmlns:a16="http://schemas.microsoft.com/office/drawing/2014/main" xmlns="" id="{D47A60E3-3D29-46FE-AB63-A695505C87E9}"/>
+                <a16:creationId xmlns="" xmlns:a16="http://schemas.microsoft.com/office/drawing/2014/main" id="{D47A60E3-3D29-46FE-AB63-A695505C87E9}"/>
               </a:ext>
             </a:extLst>
           </p:cNvPr>
@@ -1619,7 +1617,7 @@
           <p:cNvPr id="12" name="Picture 11" descr="A close up of a logo&#10;&#10;Description generated with very high confidence">
             <a:extLst>
               <a:ext uri="{FF2B5EF4-FFF2-40B4-BE49-F238E27FC236}">
-                <a16:creationId xmlns:a16="http://schemas.microsoft.com/office/drawing/2014/main" xmlns="" id="{9D24ADE5-0C5C-44A1-9FF6-58956EF9737A}"/>
+                <a16:creationId xmlns="" xmlns:a16="http://schemas.microsoft.com/office/drawing/2014/main" id="{9D24ADE5-0C5C-44A1-9FF6-58956EF9737A}"/>
               </a:ext>
             </a:extLst>
           </p:cNvPr>
@@ -1654,7 +1652,7 @@
           <p:cNvPr id="14" name="Straight Connector 13">
             <a:extLst>
               <a:ext uri="{FF2B5EF4-FFF2-40B4-BE49-F238E27FC236}">
-                <a16:creationId xmlns:a16="http://schemas.microsoft.com/office/drawing/2014/main" xmlns="" id="{FA83563C-5C68-4B36-9934-4B1F666D6552}"/>
+                <a16:creationId xmlns="" xmlns:a16="http://schemas.microsoft.com/office/drawing/2014/main" id="{FA83563C-5C68-4B36-9934-4B1F666D6552}"/>
               </a:ext>
             </a:extLst>
           </p:cNvPr>
@@ -3847,7 +3845,7 @@
           <p:cNvPr id="16" name="Google Shape;109;p1">
             <a:extLst>
               <a:ext uri="{FF2B5EF4-FFF2-40B4-BE49-F238E27FC236}">
-                <a16:creationId xmlns:a16="http://schemas.microsoft.com/office/drawing/2014/main" xmlns="" id="{0A506D4D-4A00-4759-BA00-7311171B8C28}"/>
+                <a16:creationId xmlns="" xmlns:a16="http://schemas.microsoft.com/office/drawing/2014/main" id="{0A506D4D-4A00-4759-BA00-7311171B8C28}"/>
               </a:ext>
             </a:extLst>
           </p:cNvPr>
@@ -3889,7 +3887,7 @@
           <p:cNvPr id="3" name="Picture 2">
             <a:extLst>
               <a:ext uri="{FF2B5EF4-FFF2-40B4-BE49-F238E27FC236}">
-                <a16:creationId xmlns:a16="http://schemas.microsoft.com/office/drawing/2014/main" xmlns="" id="{8A961CC5-719C-4398-AF8D-A62572F029BD}"/>
+                <a16:creationId xmlns="" xmlns:a16="http://schemas.microsoft.com/office/drawing/2014/main" id="{8A961CC5-719C-4398-AF8D-A62572F029BD}"/>
               </a:ext>
             </a:extLst>
           </p:cNvPr>
@@ -3960,15 +3958,7 @@
                   <a:srgbClr val="F2F2F2"/>
                 </a:solidFill>
               </a:rPr>
-              <a:t>Aug</a:t>
-            </a:r>
-            <a:r>
-              <a:rPr lang="en-US" sz="1400" b="1" smtClean="0">
-                <a:solidFill>
-                  <a:srgbClr val="F2F2F2"/>
-                </a:solidFill>
-              </a:rPr>
-              <a:t> 20</a:t>
+              <a:t>Aug 20</a:t>
             </a:r>
             <a:r>
               <a:rPr lang="en-US" sz="1400" b="1" baseline="30000" smtClean="0">
@@ -4029,7 +4019,7 @@
           <p:cNvPr id="6" name="Group 5">
             <a:extLst>
               <a:ext uri="{FF2B5EF4-FFF2-40B4-BE49-F238E27FC236}">
-                <a16:creationId xmlns:a16="http://schemas.microsoft.com/office/drawing/2014/main" xmlns="" id="{793FF1EC-598A-4285-B0F2-7876C0278B4B}"/>
+                <a16:creationId xmlns="" xmlns:a16="http://schemas.microsoft.com/office/drawing/2014/main" id="{793FF1EC-598A-4285-B0F2-7876C0278B4B}"/>
               </a:ext>
             </a:extLst>
           </p:cNvPr>
@@ -4049,7 +4039,7 @@
             <p:cNvPr id="12" name="Google Shape;105;p1">
               <a:extLst>
                 <a:ext uri="{FF2B5EF4-FFF2-40B4-BE49-F238E27FC236}">
-                  <a16:creationId xmlns:a16="http://schemas.microsoft.com/office/drawing/2014/main" xmlns="" id="{D2935C59-C4EC-4552-9E8E-47D6A6E4851D}"/>
+                  <a16:creationId xmlns="" xmlns:a16="http://schemas.microsoft.com/office/drawing/2014/main" id="{D2935C59-C4EC-4552-9E8E-47D6A6E4851D}"/>
                 </a:ext>
               </a:extLst>
             </p:cNvPr>
@@ -4315,7 +4305,7 @@
             <p:cNvPr id="13" name="Google Shape;109;p1">
               <a:extLst>
                 <a:ext uri="{FF2B5EF4-FFF2-40B4-BE49-F238E27FC236}">
-                  <a16:creationId xmlns:a16="http://schemas.microsoft.com/office/drawing/2014/main" xmlns="" id="{6FDB471B-3693-44DC-9ED8-85508316CE08}"/>
+                  <a16:creationId xmlns="" xmlns:a16="http://schemas.microsoft.com/office/drawing/2014/main" id="{6FDB471B-3693-44DC-9ED8-85508316CE08}"/>
                 </a:ext>
               </a:extLst>
             </p:cNvPr>
@@ -4360,7 +4350,7 @@
           <p:cNvPr id="7" name="Group 6">
             <a:extLst>
               <a:ext uri="{FF2B5EF4-FFF2-40B4-BE49-F238E27FC236}">
-                <a16:creationId xmlns:a16="http://schemas.microsoft.com/office/drawing/2014/main" xmlns="" id="{56B78E3F-2B1A-4CFF-B80B-EE4C815143F4}"/>
+                <a16:creationId xmlns="" xmlns:a16="http://schemas.microsoft.com/office/drawing/2014/main" id="{56B78E3F-2B1A-4CFF-B80B-EE4C815143F4}"/>
               </a:ext>
             </a:extLst>
           </p:cNvPr>
@@ -4524,7 +4514,7 @@
             <p:cNvPr id="21" name="Picture 2" descr="Káº¿t quáº£ hÃ¬nh áº£nh cho uit logo png">
               <a:extLst>
                 <a:ext uri="{FF2B5EF4-FFF2-40B4-BE49-F238E27FC236}">
-                  <a16:creationId xmlns:a16="http://schemas.microsoft.com/office/drawing/2014/main" xmlns="" id="{F2DC505C-2E25-4AE7-9C7D-73F6542FD6FA}"/>
+                  <a16:creationId xmlns="" xmlns:a16="http://schemas.microsoft.com/office/drawing/2014/main" id="{F2DC505C-2E25-4AE7-9C7D-73F6542FD6FA}"/>
                 </a:ext>
               </a:extLst>
             </p:cNvPr>
@@ -4587,7 +4577,7 @@
             <p:cNvPr id="25" name="Google Shape;107;p1">
               <a:extLst>
                 <a:ext uri="{FF2B5EF4-FFF2-40B4-BE49-F238E27FC236}">
-                  <a16:creationId xmlns:a16="http://schemas.microsoft.com/office/drawing/2014/main" xmlns="" id="{75409049-75FB-4C59-970D-160988C53188}"/>
+                  <a16:creationId xmlns="" xmlns:a16="http://schemas.microsoft.com/office/drawing/2014/main" id="{75409049-75FB-4C59-970D-160988C53188}"/>
                 </a:ext>
               </a:extLst>
             </p:cNvPr>
@@ -4662,7 +4652,7 @@
           <p:cNvPr id="4" name="Slide Number Placeholder 3">
             <a:extLst>
               <a:ext uri="{FF2B5EF4-FFF2-40B4-BE49-F238E27FC236}">
-                <a16:creationId xmlns:a16="http://schemas.microsoft.com/office/drawing/2014/main" xmlns="" id="{62680A04-81B6-42AB-85EB-ADA579D42BBB}"/>
+                <a16:creationId xmlns="" xmlns:a16="http://schemas.microsoft.com/office/drawing/2014/main" id="{62680A04-81B6-42AB-85EB-ADA579D42BBB}"/>
               </a:ext>
             </a:extLst>
           </p:cNvPr>
@@ -4779,7 +4769,7 @@
             </a:pPr>
             <a:r>
               <a:rPr lang="en-US" b="1" smtClean="0"/>
-              <a:t>Huấn luyện mô hình</a:t>
+              <a:t>Dữ liệu đầu vào:</a:t>
             </a:r>
             <a:r>
               <a:rPr lang="en-US"/>
@@ -4825,6 +4815,59 @@
           </a:p>
         </p:txBody>
       </p:sp>
+      <p:pic>
+        <p:nvPicPr>
+          <p:cNvPr id="6" name="Picture 5"/>
+          <p:cNvPicPr>
+            <a:picLocks noChangeAspect="1"/>
+          </p:cNvPicPr>
+          <p:nvPr/>
+        </p:nvPicPr>
+        <p:blipFill>
+          <a:blip r:embed="rId2"/>
+          <a:stretch>
+            <a:fillRect/>
+          </a:stretch>
+        </p:blipFill>
+        <p:spPr>
+          <a:xfrm>
+            <a:off x="216567" y="4838449"/>
+            <a:ext cx="8383509" cy="918307"/>
+          </a:xfrm>
+          <a:prstGeom prst="rect">
+            <a:avLst/>
+          </a:prstGeom>
+        </p:spPr>
+      </p:pic>
+      <p:pic>
+        <p:nvPicPr>
+          <p:cNvPr id="8" name="Picture 7"/>
+          <p:cNvPicPr>
+            <a:picLocks noChangeAspect="1"/>
+          </p:cNvPicPr>
+          <p:nvPr/>
+        </p:nvPicPr>
+        <p:blipFill>
+          <a:blip r:embed="rId3"/>
+          <a:stretch>
+            <a:fillRect/>
+          </a:stretch>
+        </p:blipFill>
+        <p:spPr>
+          <a:xfrm>
+            <a:off x="282542" y="1582748"/>
+            <a:ext cx="6292875" cy="2963741"/>
+          </a:xfrm>
+          <a:prstGeom prst="rect">
+            <a:avLst/>
+          </a:prstGeom>
+          <a:ln>
+            <a:solidFill>
+              <a:schemeClr val="tx1"/>
+            </a:solidFill>
+          </a:ln>
+        </p:spPr>
+      </p:pic>
     </p:spTree>
     <p:extLst>
       <p:ext uri="{BB962C8B-B14F-4D97-AF65-F5344CB8AC3E}">
@@ -4910,14 +4953,29 @@
             </a:pPr>
             <a:r>
               <a:rPr lang="en-US" b="1" smtClean="0"/>
-              <a:t>Kết quả sau khi huấn luyện mô hình với tập datatrain và dataset</a:t>
-            </a:r>
-            <a:r>
-              <a:rPr lang="en-US"/>
+              <a:t>Dữ liệu đầu </a:t>
+            </a:r>
+            <a:r>
+              <a:rPr lang="en-US" b="1" smtClean="0"/>
+              <a:t>ra:</a:t>
+            </a:r>
+          </a:p>
+          <a:p>
+            <a:pPr marL="0" indent="0">
+              <a:buNone/>
+            </a:pPr>
+            <a:endParaRPr lang="en-US" b="1"/>
+          </a:p>
+          <a:p>
+            <a:pPr marL="0" indent="0">
+              <a:buNone/>
+            </a:pPr>
+            <a:r>
+              <a:rPr lang="en-US" smtClean="0"/>
               <a:t/>
             </a:r>
             <a:br>
-              <a:rPr lang="en-US"/>
+              <a:rPr lang="en-US" smtClean="0"/>
             </a:br>
             <a:endParaRPr lang="en-US">
               <a:latin typeface="Times New Roman" panose="02020603050405020304" pitchFamily="18" charset="0"/>
@@ -4956,10 +5014,34 @@
           </a:p>
         </p:txBody>
       </p:sp>
+      <p:pic>
+        <p:nvPicPr>
+          <p:cNvPr id="9" name="Picture 8"/>
+          <p:cNvPicPr>
+            <a:picLocks noChangeAspect="1"/>
+          </p:cNvPicPr>
+          <p:nvPr/>
+        </p:nvPicPr>
+        <p:blipFill>
+          <a:blip r:embed="rId2"/>
+          <a:stretch>
+            <a:fillRect/>
+          </a:stretch>
+        </p:blipFill>
+        <p:spPr>
+          <a:xfrm>
+            <a:off x="216567" y="1532810"/>
+            <a:ext cx="8745648" cy="3707768"/>
+          </a:xfrm>
+          <a:prstGeom prst="rect">
+            <a:avLst/>
+          </a:prstGeom>
+        </p:spPr>
+      </p:pic>
     </p:spTree>
     <p:extLst>
       <p:ext uri="{BB962C8B-B14F-4D97-AF65-F5344CB8AC3E}">
-        <p14:creationId xmlns:p14="http://schemas.microsoft.com/office/powerpoint/2010/main" val="1027783429"/>
+        <p14:creationId xmlns:p14="http://schemas.microsoft.com/office/powerpoint/2010/main" val="2560406516"/>
       </p:ext>
     </p:extLst>
   </p:cSld>
@@ -5011,8 +5093,11 @@
           <a:lstStyle/>
           <a:p>
             <a:r>
-              <a:rPr lang="en-US"/>
-              <a:t>Thực nghiệm và đánh giá</a:t>
+              <a:rPr lang="en-US" smtClean="0">
+                <a:latin typeface="Times New Roman" panose="02020603050405020304" pitchFamily="18" charset="0"/>
+                <a:cs typeface="Times New Roman" panose="02020603050405020304" pitchFamily="18" charset="0"/>
+              </a:rPr>
+              <a:t>Tự đánh giá mô hình</a:t>
             </a:r>
             <a:endParaRPr lang="en-US">
               <a:latin typeface="Times New Roman" panose="02020603050405020304" pitchFamily="18" charset="0"/>
@@ -5033,24 +5118,74 @@
         </p:nvSpPr>
         <p:spPr/>
         <p:txBody>
-          <a:bodyPr/>
-          <a:lstStyle/>
-          <a:p>
-            <a:pPr marL="0" indent="0">
-              <a:buNone/>
-            </a:pPr>
-            <a:r>
-              <a:rPr lang="en-US" b="1" smtClean="0"/>
-              <a:t>Dữ liệu đầu ra</a:t>
-            </a:r>
-            <a:r>
-              <a:rPr lang="en-US" smtClean="0"/>
-              <a:t/>
-            </a:r>
-            <a:br>
-              <a:rPr lang="en-US" smtClean="0"/>
-            </a:br>
-            <a:endParaRPr lang="en-US">
+          <a:bodyPr>
+            <a:normAutofit/>
+          </a:bodyPr>
+          <a:lstStyle/>
+          <a:p>
+            <a:r>
+              <a:rPr lang="vi-VN" sz="2000" b="1">
+                <a:latin typeface="Times New Roman" panose="02020603050405020304" pitchFamily="18" charset="0"/>
+                <a:cs typeface="Times New Roman" panose="02020603050405020304" pitchFamily="18" charset="0"/>
+              </a:rPr>
+              <a:t>Điểm mạnh</a:t>
+            </a:r>
+            <a:r>
+              <a:rPr lang="vi-VN" sz="2000">
+                <a:latin typeface="Times New Roman" panose="02020603050405020304" pitchFamily="18" charset="0"/>
+                <a:cs typeface="Times New Roman" panose="02020603050405020304" pitchFamily="18" charset="0"/>
+              </a:rPr>
+              <a:t>: Pipeline end-to-end chạy ổn (đọc CV/JD → NLP → đặc trưng → phân loại → gợi ý); trích xuất thông tin cơ bản khá ổn và cho tín hiệu so khớp hữu ích.</a:t>
+            </a:r>
+          </a:p>
+          <a:p>
+            <a:r>
+              <a:rPr lang="vi-VN" sz="2000" b="1">
+                <a:latin typeface="Times New Roman" panose="02020603050405020304" pitchFamily="18" charset="0"/>
+                <a:cs typeface="Times New Roman" panose="02020603050405020304" pitchFamily="18" charset="0"/>
+              </a:rPr>
+              <a:t>Tính hữu dụng</a:t>
+            </a:r>
+            <a:r>
+              <a:rPr lang="vi-VN" sz="2000">
+                <a:latin typeface="Times New Roman" panose="02020603050405020304" pitchFamily="18" charset="0"/>
+                <a:cs typeface="Times New Roman" panose="02020603050405020304" pitchFamily="18" charset="0"/>
+              </a:rPr>
+              <a:t>: Hỗ trợ rút ngắn sàng lọc ban đầu; kết quả phân loại minh hoạ nhất quán giữa các lần chạy demo.</a:t>
+            </a:r>
+          </a:p>
+          <a:p>
+            <a:r>
+              <a:rPr lang="vi-VN" sz="2000" b="1">
+                <a:latin typeface="Times New Roman" panose="02020603050405020304" pitchFamily="18" charset="0"/>
+                <a:cs typeface="Times New Roman" panose="02020603050405020304" pitchFamily="18" charset="0"/>
+              </a:rPr>
+              <a:t>Hạn chế chính</a:t>
+            </a:r>
+            <a:r>
+              <a:rPr lang="vi-VN" sz="2000">
+                <a:latin typeface="Times New Roman" panose="02020603050405020304" pitchFamily="18" charset="0"/>
+                <a:cs typeface="Times New Roman" panose="02020603050405020304" pitchFamily="18" charset="0"/>
+              </a:rPr>
+              <a:t>: Khuyến nghị câu hỏi còn lệch trọng tâm JD; phụ thuộc dữ liệu/nhãn còn hạn chế nên khó kết luận chất lượng thật.</a:t>
+            </a:r>
+          </a:p>
+          <a:p>
+            <a:r>
+              <a:rPr lang="vi-VN" sz="2000" b="1">
+                <a:latin typeface="Times New Roman" panose="02020603050405020304" pitchFamily="18" charset="0"/>
+                <a:cs typeface="Times New Roman" panose="02020603050405020304" pitchFamily="18" charset="0"/>
+              </a:rPr>
+              <a:t>Độ tin cậy</a:t>
+            </a:r>
+            <a:r>
+              <a:rPr lang="vi-VN" sz="2000">
+                <a:latin typeface="Times New Roman" panose="02020603050405020304" pitchFamily="18" charset="0"/>
+                <a:cs typeface="Times New Roman" panose="02020603050405020304" pitchFamily="18" charset="0"/>
+              </a:rPr>
+              <a:t>: Điểm xếp hạng gợi ý chưa cao và thiếu lọc theo chủ đề; cần hiệu chuẩn điểm và ngưỡng tối thiểu.</a:t>
+            </a:r>
+            <a:endParaRPr lang="en-US" sz="2000">
               <a:latin typeface="Times New Roman" panose="02020603050405020304" pitchFamily="18" charset="0"/>
               <a:cs typeface="Times New Roman" panose="02020603050405020304" pitchFamily="18" charset="0"/>
             </a:endParaRPr>
@@ -5090,7 +5225,7 @@
     </p:spTree>
     <p:extLst>
       <p:ext uri="{BB962C8B-B14F-4D97-AF65-F5344CB8AC3E}">
-        <p14:creationId xmlns:p14="http://schemas.microsoft.com/office/powerpoint/2010/main" val="2560406516"/>
+        <p14:creationId xmlns:p14="http://schemas.microsoft.com/office/powerpoint/2010/main" val="1672027816"/>
       </p:ext>
     </p:extLst>
   </p:cSld>
@@ -5142,8 +5277,18 @@
           <a:lstStyle/>
           <a:p>
             <a:r>
-              <a:rPr lang="en-US"/>
-              <a:t>Thực nghiệm và đánh giá</a:t>
+              <a:rPr lang="en-US">
+                <a:latin typeface="Times New Roman" panose="02020603050405020304" pitchFamily="18" charset="0"/>
+                <a:cs typeface="Times New Roman" panose="02020603050405020304" pitchFamily="18" charset="0"/>
+              </a:rPr>
+              <a:t>Kết </a:t>
+            </a:r>
+            <a:r>
+              <a:rPr lang="en-US" smtClean="0">
+                <a:latin typeface="Times New Roman" panose="02020603050405020304" pitchFamily="18" charset="0"/>
+                <a:cs typeface="Times New Roman" panose="02020603050405020304" pitchFamily="18" charset="0"/>
+              </a:rPr>
+              <a:t>luận và hướng phát triển</a:t>
             </a:r>
             <a:endParaRPr lang="en-US">
               <a:latin typeface="Times New Roman" panose="02020603050405020304" pitchFamily="18" charset="0"/>
@@ -5164,72 +5309,153 @@
         </p:nvSpPr>
         <p:spPr/>
         <p:txBody>
-          <a:bodyPr/>
+          <a:bodyPr>
+            <a:normAutofit fontScale="92500" lnSpcReduction="10000"/>
+          </a:bodyPr>
           <a:lstStyle/>
           <a:p>
             <a:pPr marL="0" indent="0">
               <a:buNone/>
             </a:pPr>
             <a:r>
-              <a:rPr lang="en-US" b="1">
+              <a:rPr lang="en-US" sz="2000" b="1" smtClean="0">
                 <a:latin typeface="Times New Roman" panose="02020603050405020304" pitchFamily="18" charset="0"/>
                 <a:cs typeface="Times New Roman" panose="02020603050405020304" pitchFamily="18" charset="0"/>
               </a:rPr>
-              <a:t>Kết quả thực nghiệm</a:t>
-            </a:r>
-            <a:endParaRPr lang="en-US" b="1" smtClean="0">
+              <a:t>Kết luận</a:t>
+            </a:r>
+            <a:r>
+              <a:rPr lang="vi-VN" sz="2000" b="1" smtClean="0">
+                <a:latin typeface="Times New Roman" panose="02020603050405020304" pitchFamily="18" charset="0"/>
+                <a:cs typeface="Times New Roman" panose="02020603050405020304" pitchFamily="18" charset="0"/>
+              </a:rPr>
+              <a:t>:</a:t>
+            </a:r>
+            <a:endParaRPr lang="vi-VN" sz="2000" b="1">
               <a:latin typeface="Times New Roman" panose="02020603050405020304" pitchFamily="18" charset="0"/>
               <a:cs typeface="Times New Roman" panose="02020603050405020304" pitchFamily="18" charset="0"/>
             </a:endParaRPr>
           </a:p>
           <a:p>
-            <a:r>
-              <a:rPr lang="vi-VN" smtClean="0">
+            <a:pPr marL="0" indent="0">
+              <a:buNone/>
+            </a:pPr>
+            <a:r>
+              <a:rPr lang="vi-VN" sz="2000" smtClean="0">
                 <a:latin typeface="Times New Roman" panose="02020603050405020304" pitchFamily="18" charset="0"/>
                 <a:cs typeface="Times New Roman" panose="02020603050405020304" pitchFamily="18" charset="0"/>
               </a:rPr>
-              <a:t>NER</a:t>
-            </a:r>
-            <a:r>
-              <a:rPr lang="vi-VN">
+              <a:t>Hệ </a:t>
+            </a:r>
+            <a:r>
+              <a:rPr lang="vi-VN" sz="2000">
                 <a:latin typeface="Times New Roman" panose="02020603050405020304" pitchFamily="18" charset="0"/>
                 <a:cs typeface="Times New Roman" panose="02020603050405020304" pitchFamily="18" charset="0"/>
               </a:rPr>
-              <a:t>: Độ chính xác cao</a:t>
-            </a:r>
-          </a:p>
-          <a:p>
-            <a:r>
-              <a:rPr lang="vi-VN">
+              <a:t>thống đã chứng minh được khả năng tự động phân tích hồ sơ và đo mức phù hợp với mô tả công việc ở mức khá, giúp rút ngắn thời gian sàng lọc và hỗ trợ ra quyết định. Tuy nhiên, phần khuyến nghị còn chưa bám sát nhu cầu thực tế trong mọi tình huống, do dữ liệu gán nhãn còn hạn chế và cơ chế xếp hạng chưa đủ tinh </a:t>
+            </a:r>
+            <a:r>
+              <a:rPr lang="vi-VN" sz="2000">
                 <a:latin typeface="Times New Roman" panose="02020603050405020304" pitchFamily="18" charset="0"/>
                 <a:cs typeface="Times New Roman" panose="02020603050405020304" pitchFamily="18" charset="0"/>
               </a:rPr>
-              <a:t>Phân loại: Sentence-BERT + ML vượt trội TF-IDF</a:t>
-            </a:r>
-          </a:p>
-          <a:p>
-            <a:r>
-              <a:rPr lang="vi-VN">
+              <a:t>chỉnh</a:t>
+            </a:r>
+            <a:r>
+              <a:rPr lang="vi-VN" sz="2000" smtClean="0">
                 <a:latin typeface="Times New Roman" panose="02020603050405020304" pitchFamily="18" charset="0"/>
                 <a:cs typeface="Times New Roman" panose="02020603050405020304" pitchFamily="18" charset="0"/>
               </a:rPr>
-              <a:t>ROC Curve: Random Forest và NN tốt hơn Logistic Regression</a:t>
-            </a:r>
-          </a:p>
-          <a:p>
-            <a:r>
-              <a:rPr lang="vi-VN">
-                <a:latin typeface="Times New Roman" panose="02020603050405020304" pitchFamily="18" charset="0"/>
-                <a:cs typeface="Times New Roman" panose="02020603050405020304" pitchFamily="18" charset="0"/>
-              </a:rPr>
-              <a:t>Câu hỏi phỏng vấn: HR đánh giá cao về tính phù hợp</a:t>
-            </a:r>
-          </a:p>
-          <a:p>
-            <a:endParaRPr lang="en-US">
+              <a:t>.</a:t>
+            </a:r>
+            <a:endParaRPr lang="en-US" sz="2000" smtClean="0">
               <a:latin typeface="Times New Roman" panose="02020603050405020304" pitchFamily="18" charset="0"/>
               <a:cs typeface="Times New Roman" panose="02020603050405020304" pitchFamily="18" charset="0"/>
             </a:endParaRPr>
+          </a:p>
+          <a:p>
+            <a:pPr marL="0" indent="0">
+              <a:buNone/>
+            </a:pPr>
+            <a:endParaRPr lang="vi-VN" sz="2000">
+              <a:latin typeface="Times New Roman" panose="02020603050405020304" pitchFamily="18" charset="0"/>
+              <a:cs typeface="Times New Roman" panose="02020603050405020304" pitchFamily="18" charset="0"/>
+            </a:endParaRPr>
+          </a:p>
+          <a:p>
+            <a:pPr marL="0" indent="0">
+              <a:buNone/>
+            </a:pPr>
+            <a:r>
+              <a:rPr lang="vi-VN" sz="2000" b="1">
+                <a:latin typeface="Times New Roman" panose="02020603050405020304" pitchFamily="18" charset="0"/>
+                <a:cs typeface="Times New Roman" panose="02020603050405020304" pitchFamily="18" charset="0"/>
+              </a:rPr>
+              <a:t>Hướng </a:t>
+            </a:r>
+            <a:r>
+              <a:rPr lang="en-US" sz="2000" b="1" smtClean="0">
+                <a:latin typeface="Times New Roman" panose="02020603050405020304" pitchFamily="18" charset="0"/>
+                <a:cs typeface="Times New Roman" panose="02020603050405020304" pitchFamily="18" charset="0"/>
+              </a:rPr>
+              <a:t>phát triển</a:t>
+            </a:r>
+            <a:r>
+              <a:rPr lang="vi-VN" sz="2000" b="1" smtClean="0">
+                <a:latin typeface="Times New Roman" panose="02020603050405020304" pitchFamily="18" charset="0"/>
+                <a:cs typeface="Times New Roman" panose="02020603050405020304" pitchFamily="18" charset="0"/>
+              </a:rPr>
+              <a:t>:</a:t>
+            </a:r>
+            <a:endParaRPr lang="vi-VN" sz="2000" b="1">
+              <a:latin typeface="Times New Roman" panose="02020603050405020304" pitchFamily="18" charset="0"/>
+              <a:cs typeface="Times New Roman" panose="02020603050405020304" pitchFamily="18" charset="0"/>
+            </a:endParaRPr>
+          </a:p>
+          <a:p>
+            <a:r>
+              <a:rPr lang="vi-VN" sz="2000">
+                <a:latin typeface="Times New Roman" panose="02020603050405020304" pitchFamily="18" charset="0"/>
+                <a:cs typeface="Times New Roman" panose="02020603050405020304" pitchFamily="18" charset="0"/>
+              </a:rPr>
+              <a:t>Mở rộng dữ liệu: thu thập thêm CV/JD đa nguồn; bổ sung bộ câu hỏi tình huống &amp; hành vi; chuẩn hoá quy trình gán nhãn để đánh giá khách quan.</a:t>
+            </a:r>
+          </a:p>
+          <a:p>
+            <a:r>
+              <a:rPr lang="vi-VN" sz="2000">
+                <a:latin typeface="Times New Roman" panose="02020603050405020304" pitchFamily="18" charset="0"/>
+                <a:cs typeface="Times New Roman" panose="02020603050405020304" pitchFamily="18" charset="0"/>
+              </a:rPr>
+              <a:t>Nâng cấp NLP: áp dụng mô hình ngôn ngữ lớn/đa ngôn ngữ; chuẩn hoá khái niệm bằng ontology; cải thiện bộ đọc tài liệu để xử lý bố cục phức tạp.</a:t>
+            </a:r>
+          </a:p>
+          <a:p>
+            <a:r>
+              <a:rPr lang="vi-VN" sz="2000">
+                <a:latin typeface="Times New Roman" panose="02020603050405020304" pitchFamily="18" charset="0"/>
+                <a:cs typeface="Times New Roman" panose="02020603050405020304" pitchFamily="18" charset="0"/>
+              </a:rPr>
+              <a:t>Đa ngôn ngữ: hỗ trợ nhiều ngôn ngữ và so khớp ngữ nghĩa xuyên ngôn ngữ; tự động phát hiện ngôn ngữ đầu vào.</a:t>
+            </a:r>
+          </a:p>
+          <a:p>
+            <a:r>
+              <a:rPr lang="vi-VN" sz="2000">
+                <a:latin typeface="Times New Roman" panose="02020603050405020304" pitchFamily="18" charset="0"/>
+                <a:cs typeface="Times New Roman" panose="02020603050405020304" pitchFamily="18" charset="0"/>
+              </a:rPr>
+              <a:t>Cá nhân hoá: gợi ý lộ trình phát triển cho ứng viên; cung cấp báo cáo phân tích chi tiết, giải thích được cho nhà tuyển dụng.</a:t>
+            </a:r>
+          </a:p>
+          <a:p>
+            <a:r>
+              <a:rPr lang="vi-VN" sz="2000">
+                <a:latin typeface="Times New Roman" panose="02020603050405020304" pitchFamily="18" charset="0"/>
+                <a:cs typeface="Times New Roman" panose="02020603050405020304" pitchFamily="18" charset="0"/>
+              </a:rPr>
+              <a:t>Tích hợp &amp; triển khai: kết nối với các nền tảng tuyển dụng; xây dựng giao diện web/app thân thiện; bổ sung theo dõi chất lượng, bảo mật và quyền riêng tư.</a:t>
+            </a:r>
           </a:p>
         </p:txBody>
       </p:sp>
@@ -5266,7 +5492,7 @@
     </p:spTree>
     <p:extLst>
       <p:ext uri="{BB962C8B-B14F-4D97-AF65-F5344CB8AC3E}">
-        <p14:creationId xmlns:p14="http://schemas.microsoft.com/office/powerpoint/2010/main" val="1577118349"/>
+        <p14:creationId xmlns:p14="http://schemas.microsoft.com/office/powerpoint/2010/main" val="1571460065"/>
       </p:ext>
     </p:extLst>
   </p:cSld>
@@ -5318,12 +5544,16 @@
           <a:lstStyle/>
           <a:p>
             <a:r>
-              <a:rPr lang="en-US">
+              <a:rPr lang="vi-VN">
                 <a:latin typeface="Times New Roman" panose="02020603050405020304" pitchFamily="18" charset="0"/>
                 <a:cs typeface="Times New Roman" panose="02020603050405020304" pitchFamily="18" charset="0"/>
               </a:rPr>
-              <a:t>Tiêu chí đánh giá</a:t>
-            </a:r>
+              <a:t>Hướng phát triển</a:t>
+            </a:r>
+            <a:endParaRPr lang="en-US">
+              <a:latin typeface="Times New Roman" panose="02020603050405020304" pitchFamily="18" charset="0"/>
+              <a:cs typeface="Times New Roman" panose="02020603050405020304" pitchFamily="18" charset="0"/>
+            </a:endParaRPr>
           </a:p>
         </p:txBody>
       </p:sp>
@@ -5343,36 +5573,54 @@
           <a:lstStyle/>
           <a:p>
             <a:r>
-              <a:rPr lang="en-US" smtClean="0">
+              <a:rPr lang="vi-VN" smtClean="0">
                 <a:latin typeface="Times New Roman" panose="02020603050405020304" pitchFamily="18" charset="0"/>
                 <a:cs typeface="Times New Roman" panose="02020603050405020304" pitchFamily="18" charset="0"/>
               </a:rPr>
-              <a:t>NER/NLP</a:t>
-            </a:r>
-            <a:r>
-              <a:rPr lang="en-US">
+              <a:t>Mở </a:t>
+            </a:r>
+            <a:r>
+              <a:rPr lang="vi-VN">
                 <a:latin typeface="Times New Roman" panose="02020603050405020304" pitchFamily="18" charset="0"/>
                 <a:cs typeface="Times New Roman" panose="02020603050405020304" pitchFamily="18" charset="0"/>
               </a:rPr>
-              <a:t>: Precision, Recall, F1-Score</a:t>
-            </a:r>
-          </a:p>
-          <a:p>
-            <a:r>
-              <a:rPr lang="en-US">
+              <a:t>rộng dữ liệu: đa dạng ngành nghề, cấp bậc</a:t>
+            </a:r>
+          </a:p>
+          <a:p>
+            <a:r>
+              <a:rPr lang="vi-VN">
                 <a:latin typeface="Times New Roman" panose="02020603050405020304" pitchFamily="18" charset="0"/>
                 <a:cs typeface="Times New Roman" panose="02020603050405020304" pitchFamily="18" charset="0"/>
               </a:rPr>
-              <a:t>Phân loại CV–JD: F1-Score, AUC-ROC</a:t>
-            </a:r>
-          </a:p>
-          <a:p>
-            <a:r>
-              <a:rPr lang="en-US">
+              <a:t>Ứng dụng mô hình ngôn ngữ lớn (GPT, multilingual BERT)</a:t>
+            </a:r>
+          </a:p>
+          <a:p>
+            <a:r>
+              <a:rPr lang="vi-VN">
                 <a:latin typeface="Times New Roman" panose="02020603050405020304" pitchFamily="18" charset="0"/>
                 <a:cs typeface="Times New Roman" panose="02020603050405020304" pitchFamily="18" charset="0"/>
               </a:rPr>
-              <a:t>Sinh câu hỏi: Đa dạng ngữ nghĩa + HR reviewer đánh giá tính hữu ích</a:t>
+              <a:t>Hỗ trợ đa ngôn ngữ, cross-lingual embeddings</a:t>
+            </a:r>
+          </a:p>
+          <a:p>
+            <a:r>
+              <a:rPr lang="vi-VN">
+                <a:latin typeface="Times New Roman" panose="02020603050405020304" pitchFamily="18" charset="0"/>
+                <a:cs typeface="Times New Roman" panose="02020603050405020304" pitchFamily="18" charset="0"/>
+              </a:rPr>
+              <a:t>Phát triển web/app + tích hợp nền tảng tuyển dụng</a:t>
+            </a:r>
+          </a:p>
+          <a:p>
+            <a:r>
+              <a:rPr lang="vi-VN">
+                <a:latin typeface="Times New Roman" panose="02020603050405020304" pitchFamily="18" charset="0"/>
+                <a:cs typeface="Times New Roman" panose="02020603050405020304" pitchFamily="18" charset="0"/>
+              </a:rPr>
+              <a:t>Cá nhân hóa sâu hơn: đề xuất lộ trình kỹ năng cho ứng viên</a:t>
             </a:r>
           </a:p>
         </p:txBody>
@@ -5410,7 +5658,7 @@
     </p:spTree>
     <p:extLst>
       <p:ext uri="{BB962C8B-B14F-4D97-AF65-F5344CB8AC3E}">
-        <p14:creationId xmlns:p14="http://schemas.microsoft.com/office/powerpoint/2010/main" val="1672027816"/>
+        <p14:creationId xmlns:p14="http://schemas.microsoft.com/office/powerpoint/2010/main" val="1471892636"/>
       </p:ext>
     </p:extLst>
   </p:cSld>
@@ -5462,12 +5710,10 @@
           <a:lstStyle/>
           <a:p>
             <a:r>
-              <a:rPr lang="en-US">
-                <a:latin typeface="Times New Roman" panose="02020603050405020304" pitchFamily="18" charset="0"/>
-                <a:cs typeface="Times New Roman" panose="02020603050405020304" pitchFamily="18" charset="0"/>
-              </a:rPr>
-              <a:t>Kết luận</a:t>
-            </a:r>
+              <a:rPr lang="en-US" smtClean="0"/>
+              <a:t>Demo</a:t>
+            </a:r>
+            <a:endParaRPr lang="en-US"/>
           </a:p>
         </p:txBody>
       </p:sp>
@@ -5486,95 +5732,11 @@
           <a:bodyPr/>
           <a:lstStyle/>
           <a:p>
-            <a:pPr marL="0" indent="0">
-              <a:buNone/>
-            </a:pPr>
-            <a:r>
-              <a:rPr lang="en-US" smtClean="0">
-                <a:latin typeface="Times New Roman" panose="02020603050405020304" pitchFamily="18" charset="0"/>
-                <a:cs typeface="Times New Roman" panose="02020603050405020304" pitchFamily="18" charset="0"/>
-              </a:rPr>
-              <a:t>Xây dựng được mô hình lọc hồ sơ ứng viên với mô tả công việc có độ chính xác cao &gt; 80%</a:t>
-            </a:r>
-          </a:p>
-          <a:p>
-            <a:pPr marL="0" indent="0">
-              <a:buNone/>
-            </a:pPr>
-            <a:r>
-              <a:rPr lang="en-US" smtClean="0">
-                <a:latin typeface="Times New Roman" panose="02020603050405020304" pitchFamily="18" charset="0"/>
-                <a:cs typeface="Times New Roman" panose="02020603050405020304" pitchFamily="18" charset="0"/>
-              </a:rPr>
-              <a:t>Xây dựng được mô hình sinh bộ câu hỏi cho ứng viên dựa trên hồ sơ ứng viên với đồ phù hợp với từng ứng viên</a:t>
-            </a:r>
-          </a:p>
-          <a:p>
-            <a:r>
-              <a:rPr lang="vi-VN" smtClean="0">
-                <a:latin typeface="Times New Roman" panose="02020603050405020304" pitchFamily="18" charset="0"/>
-                <a:cs typeface="Times New Roman" panose="02020603050405020304" pitchFamily="18" charset="0"/>
-              </a:rPr>
-              <a:t>Hệ </a:t>
-            </a:r>
-            <a:r>
-              <a:rPr lang="vi-VN">
-                <a:latin typeface="Times New Roman" panose="02020603050405020304" pitchFamily="18" charset="0"/>
-                <a:cs typeface="Times New Roman" panose="02020603050405020304" pitchFamily="18" charset="0"/>
-              </a:rPr>
-              <a:t>thống đã xây dựng gồm:</a:t>
-            </a:r>
-          </a:p>
-          <a:p>
-            <a:r>
-              <a:rPr lang="vi-VN">
-                <a:latin typeface="Times New Roman" panose="02020603050405020304" pitchFamily="18" charset="0"/>
-                <a:cs typeface="Times New Roman" panose="02020603050405020304" pitchFamily="18" charset="0"/>
-              </a:rPr>
-              <a:t>- NLP để trích xuất thông tin</a:t>
-            </a:r>
-          </a:p>
-          <a:p>
-            <a:r>
-              <a:rPr lang="vi-VN">
-                <a:latin typeface="Times New Roman" panose="02020603050405020304" pitchFamily="18" charset="0"/>
-                <a:cs typeface="Times New Roman" panose="02020603050405020304" pitchFamily="18" charset="0"/>
-              </a:rPr>
-              <a:t>- TF-IDF + Sentence-BERT để đo tương đồng</a:t>
-            </a:r>
-          </a:p>
-          <a:p>
-            <a:r>
-              <a:rPr lang="vi-VN">
-                <a:latin typeface="Times New Roman" panose="02020603050405020304" pitchFamily="18" charset="0"/>
-                <a:cs typeface="Times New Roman" panose="02020603050405020304" pitchFamily="18" charset="0"/>
-              </a:rPr>
-              <a:t>- ML để phân loại ứng viên</a:t>
-            </a:r>
-          </a:p>
-          <a:p>
-            <a:r>
-              <a:rPr lang="vi-VN">
-                <a:latin typeface="Times New Roman" panose="02020603050405020304" pitchFamily="18" charset="0"/>
-                <a:cs typeface="Times New Roman" panose="02020603050405020304" pitchFamily="18" charset="0"/>
-              </a:rPr>
-              <a:t>- Sinh câu hỏi phỏng vấn cá nhân hóa</a:t>
-            </a:r>
-          </a:p>
-          <a:p>
-            <a:r>
-              <a:rPr lang="vi-VN">
-                <a:latin typeface="Times New Roman" panose="02020603050405020304" pitchFamily="18" charset="0"/>
-                <a:cs typeface="Times New Roman" panose="02020603050405020304" pitchFamily="18" charset="0"/>
-              </a:rPr>
-              <a:t>Kết quả: Nâng cao tốc độ, độ chính xác, giảm sai sót chủ quan</a:t>
-            </a:r>
-          </a:p>
-          <a:p>
-            <a:endParaRPr lang="en-US">
-              <a:latin typeface="Times New Roman" panose="02020603050405020304" pitchFamily="18" charset="0"/>
-              <a:cs typeface="Times New Roman" panose="02020603050405020304" pitchFamily="18" charset="0"/>
-            </a:endParaRPr>
+            <a:r>
+              <a:rPr lang="en-US" smtClean="0"/>
+              <a:t>Google Colab</a:t>
+            </a:r>
+            <a:endParaRPr lang="en-US"/>
           </a:p>
         </p:txBody>
       </p:sp>
@@ -5594,24 +5756,18 @@
           <a:lstStyle/>
           <a:p>
             <a:fld id="{B487F271-60DF-4592-BB7F-B45BB4441AA9}" type="slidenum">
-              <a:rPr lang="en-US" smtClean="0">
-                <a:latin typeface="Times New Roman" panose="02020603050405020304" pitchFamily="18" charset="0"/>
-                <a:cs typeface="Times New Roman" panose="02020603050405020304" pitchFamily="18" charset="0"/>
-              </a:rPr>
+              <a:rPr lang="en-US" smtClean="0"/>
               <a:pPr/>
               <a:t>15</a:t>
             </a:fld>
-            <a:endParaRPr lang="en-US">
-              <a:latin typeface="Times New Roman" panose="02020603050405020304" pitchFamily="18" charset="0"/>
-              <a:cs typeface="Times New Roman" panose="02020603050405020304" pitchFamily="18" charset="0"/>
-            </a:endParaRPr>
+            <a:endParaRPr lang="en-US"/>
           </a:p>
         </p:txBody>
       </p:sp>
     </p:spTree>
     <p:extLst>
       <p:ext uri="{BB962C8B-B14F-4D97-AF65-F5344CB8AC3E}">
-        <p14:creationId xmlns:p14="http://schemas.microsoft.com/office/powerpoint/2010/main" val="1571460065"/>
+        <p14:creationId xmlns:p14="http://schemas.microsoft.com/office/powerpoint/2010/main" val="2642583814"/>
       </p:ext>
     </p:extLst>
   </p:cSld>
@@ -5647,285 +5803,10 @@
       </p:grpSpPr>
       <p:sp>
         <p:nvSpPr>
-          <p:cNvPr id="2" name="Title 1"/>
-          <p:cNvSpPr>
-            <a:spLocks noGrp="1"/>
-          </p:cNvSpPr>
-          <p:nvPr>
-            <p:ph type="title"/>
-          </p:nvPr>
-        </p:nvSpPr>
-        <p:spPr/>
-        <p:txBody>
-          <a:bodyPr>
-            <a:normAutofit fontScale="90000"/>
-          </a:bodyPr>
-          <a:lstStyle/>
-          <a:p>
-            <a:r>
-              <a:rPr lang="vi-VN">
-                <a:latin typeface="Times New Roman" panose="02020603050405020304" pitchFamily="18" charset="0"/>
-                <a:cs typeface="Times New Roman" panose="02020603050405020304" pitchFamily="18" charset="0"/>
-              </a:rPr>
-              <a:t>Hướng phát triển</a:t>
-            </a:r>
-            <a:endParaRPr lang="en-US">
-              <a:latin typeface="Times New Roman" panose="02020603050405020304" pitchFamily="18" charset="0"/>
-              <a:cs typeface="Times New Roman" panose="02020603050405020304" pitchFamily="18" charset="0"/>
-            </a:endParaRPr>
-          </a:p>
-        </p:txBody>
-      </p:sp>
-      <p:sp>
-        <p:nvSpPr>
-          <p:cNvPr id="3" name="Content Placeholder 2"/>
-          <p:cNvSpPr>
-            <a:spLocks noGrp="1"/>
-          </p:cNvSpPr>
-          <p:nvPr>
-            <p:ph idx="1"/>
-          </p:nvPr>
-        </p:nvSpPr>
-        <p:spPr/>
-        <p:txBody>
-          <a:bodyPr/>
-          <a:lstStyle/>
-          <a:p>
-            <a:r>
-              <a:rPr lang="vi-VN" smtClean="0">
-                <a:latin typeface="Times New Roman" panose="02020603050405020304" pitchFamily="18" charset="0"/>
-                <a:cs typeface="Times New Roman" panose="02020603050405020304" pitchFamily="18" charset="0"/>
-              </a:rPr>
-              <a:t>Mở </a:t>
-            </a:r>
-            <a:r>
-              <a:rPr lang="vi-VN">
-                <a:latin typeface="Times New Roman" panose="02020603050405020304" pitchFamily="18" charset="0"/>
-                <a:cs typeface="Times New Roman" panose="02020603050405020304" pitchFamily="18" charset="0"/>
-              </a:rPr>
-              <a:t>rộng dữ liệu: đa dạng ngành nghề, cấp bậc</a:t>
-            </a:r>
-          </a:p>
-          <a:p>
-            <a:r>
-              <a:rPr lang="vi-VN">
-                <a:latin typeface="Times New Roman" panose="02020603050405020304" pitchFamily="18" charset="0"/>
-                <a:cs typeface="Times New Roman" panose="02020603050405020304" pitchFamily="18" charset="0"/>
-              </a:rPr>
-              <a:t>Ứng dụng mô hình ngôn ngữ lớn (GPT, multilingual BERT)</a:t>
-            </a:r>
-          </a:p>
-          <a:p>
-            <a:r>
-              <a:rPr lang="vi-VN">
-                <a:latin typeface="Times New Roman" panose="02020603050405020304" pitchFamily="18" charset="0"/>
-                <a:cs typeface="Times New Roman" panose="02020603050405020304" pitchFamily="18" charset="0"/>
-              </a:rPr>
-              <a:t>Hỗ trợ đa ngôn ngữ, cross-lingual embeddings</a:t>
-            </a:r>
-          </a:p>
-          <a:p>
-            <a:r>
-              <a:rPr lang="vi-VN">
-                <a:latin typeface="Times New Roman" panose="02020603050405020304" pitchFamily="18" charset="0"/>
-                <a:cs typeface="Times New Roman" panose="02020603050405020304" pitchFamily="18" charset="0"/>
-              </a:rPr>
-              <a:t>Phát triển web/app + tích hợp nền tảng tuyển dụng</a:t>
-            </a:r>
-          </a:p>
-          <a:p>
-            <a:r>
-              <a:rPr lang="vi-VN">
-                <a:latin typeface="Times New Roman" panose="02020603050405020304" pitchFamily="18" charset="0"/>
-                <a:cs typeface="Times New Roman" panose="02020603050405020304" pitchFamily="18" charset="0"/>
-              </a:rPr>
-              <a:t>Cá nhân hóa sâu hơn: đề xuất lộ trình kỹ năng cho ứng viên</a:t>
-            </a:r>
-          </a:p>
-        </p:txBody>
-      </p:sp>
-      <p:sp>
-        <p:nvSpPr>
-          <p:cNvPr id="4" name="Slide Number Placeholder 3"/>
-          <p:cNvSpPr>
-            <a:spLocks noGrp="1"/>
-          </p:cNvSpPr>
-          <p:nvPr>
-            <p:ph type="sldNum" sz="quarter" idx="12"/>
-          </p:nvPr>
-        </p:nvSpPr>
-        <p:spPr/>
-        <p:txBody>
-          <a:bodyPr/>
-          <a:lstStyle/>
-          <a:p>
-            <a:fld id="{B487F271-60DF-4592-BB7F-B45BB4441AA9}" type="slidenum">
-              <a:rPr lang="en-US" smtClean="0">
-                <a:latin typeface="Times New Roman" panose="02020603050405020304" pitchFamily="18" charset="0"/>
-                <a:cs typeface="Times New Roman" panose="02020603050405020304" pitchFamily="18" charset="0"/>
-              </a:rPr>
-              <a:pPr/>
-              <a:t>16</a:t>
-            </a:fld>
-            <a:endParaRPr lang="en-US">
-              <a:latin typeface="Times New Roman" panose="02020603050405020304" pitchFamily="18" charset="0"/>
-              <a:cs typeface="Times New Roman" panose="02020603050405020304" pitchFamily="18" charset="0"/>
-            </a:endParaRPr>
-          </a:p>
-        </p:txBody>
-      </p:sp>
-    </p:spTree>
-    <p:extLst>
-      <p:ext uri="{BB962C8B-B14F-4D97-AF65-F5344CB8AC3E}">
-        <p14:creationId xmlns:p14="http://schemas.microsoft.com/office/powerpoint/2010/main" val="1471892636"/>
-      </p:ext>
-    </p:extLst>
-  </p:cSld>
-  <p:clrMapOvr>
-    <a:masterClrMapping/>
-  </p:clrMapOvr>
-  <p:timing>
-    <p:tnLst>
-      <p:par>
-        <p:cTn id="1" dur="indefinite" restart="never" nodeType="tmRoot"/>
-      </p:par>
-    </p:tnLst>
-  </p:timing>
-</p:sld>
-</file>
-
-<file path=ppt/slides/slide17.xml><?xml version="1.0" encoding="utf-8"?>
-<p:sld xmlns:a="http://schemas.openxmlformats.org/drawingml/2006/main" xmlns:r="http://schemas.openxmlformats.org/officeDocument/2006/relationships" xmlns:p="http://schemas.openxmlformats.org/presentationml/2006/main">
-  <p:cSld>
-    <p:spTree>
-      <p:nvGrpSpPr>
-        <p:cNvPr id="1" name=""/>
-        <p:cNvGrpSpPr/>
-        <p:nvPr/>
-      </p:nvGrpSpPr>
-      <p:grpSpPr>
-        <a:xfrm>
-          <a:off x="0" y="0"/>
-          <a:ext cx="0" cy="0"/>
-          <a:chOff x="0" y="0"/>
-          <a:chExt cx="0" cy="0"/>
-        </a:xfrm>
-      </p:grpSpPr>
-      <p:sp>
-        <p:nvSpPr>
-          <p:cNvPr id="2" name="Title 1"/>
-          <p:cNvSpPr>
-            <a:spLocks noGrp="1"/>
-          </p:cNvSpPr>
-          <p:nvPr>
-            <p:ph type="title"/>
-          </p:nvPr>
-        </p:nvSpPr>
-        <p:spPr/>
-        <p:txBody>
-          <a:bodyPr>
-            <a:normAutofit fontScale="90000"/>
-          </a:bodyPr>
-          <a:lstStyle/>
-          <a:p>
-            <a:r>
-              <a:rPr lang="en-US" smtClean="0"/>
-              <a:t>Demo</a:t>
-            </a:r>
-            <a:endParaRPr lang="en-US"/>
-          </a:p>
-        </p:txBody>
-      </p:sp>
-      <p:sp>
-        <p:nvSpPr>
-          <p:cNvPr id="3" name="Content Placeholder 2"/>
-          <p:cNvSpPr>
-            <a:spLocks noGrp="1"/>
-          </p:cNvSpPr>
-          <p:nvPr>
-            <p:ph idx="1"/>
-          </p:nvPr>
-        </p:nvSpPr>
-        <p:spPr/>
-        <p:txBody>
-          <a:bodyPr/>
-          <a:lstStyle/>
-          <a:p>
-            <a:r>
-              <a:rPr lang="en-US" smtClean="0"/>
-              <a:t>Google Colab</a:t>
-            </a:r>
-            <a:endParaRPr lang="en-US"/>
-          </a:p>
-        </p:txBody>
-      </p:sp>
-      <p:sp>
-        <p:nvSpPr>
-          <p:cNvPr id="4" name="Slide Number Placeholder 3"/>
-          <p:cNvSpPr>
-            <a:spLocks noGrp="1"/>
-          </p:cNvSpPr>
-          <p:nvPr>
-            <p:ph type="sldNum" sz="quarter" idx="12"/>
-          </p:nvPr>
-        </p:nvSpPr>
-        <p:spPr/>
-        <p:txBody>
-          <a:bodyPr/>
-          <a:lstStyle/>
-          <a:p>
-            <a:fld id="{B487F271-60DF-4592-BB7F-B45BB4441AA9}" type="slidenum">
-              <a:rPr lang="en-US" smtClean="0"/>
-              <a:pPr/>
-              <a:t>17</a:t>
-            </a:fld>
-            <a:endParaRPr lang="en-US"/>
-          </a:p>
-        </p:txBody>
-      </p:sp>
-    </p:spTree>
-    <p:extLst>
-      <p:ext uri="{BB962C8B-B14F-4D97-AF65-F5344CB8AC3E}">
-        <p14:creationId xmlns:p14="http://schemas.microsoft.com/office/powerpoint/2010/main" val="2642583814"/>
-      </p:ext>
-    </p:extLst>
-  </p:cSld>
-  <p:clrMapOvr>
-    <a:masterClrMapping/>
-  </p:clrMapOvr>
-  <p:timing>
-    <p:tnLst>
-      <p:par>
-        <p:cTn id="1" dur="indefinite" restart="never" nodeType="tmRoot"/>
-      </p:par>
-    </p:tnLst>
-  </p:timing>
-</p:sld>
-</file>
-
-<file path=ppt/slides/slide18.xml><?xml version="1.0" encoding="utf-8"?>
-<p:sld xmlns:a="http://schemas.openxmlformats.org/drawingml/2006/main" xmlns:r="http://schemas.openxmlformats.org/officeDocument/2006/relationships" xmlns:p="http://schemas.openxmlformats.org/presentationml/2006/main">
-  <p:cSld>
-    <p:spTree>
-      <p:nvGrpSpPr>
-        <p:cNvPr id="1" name=""/>
-        <p:cNvGrpSpPr/>
-        <p:nvPr/>
-      </p:nvGrpSpPr>
-      <p:grpSpPr>
-        <a:xfrm>
-          <a:off x="0" y="0"/>
-          <a:ext cx="0" cy="0"/>
-          <a:chOff x="0" y="0"/>
-          <a:chExt cx="0" cy="0"/>
-        </a:xfrm>
-      </p:grpSpPr>
-      <p:sp>
-        <p:nvSpPr>
           <p:cNvPr id="2" name="Title 1">
             <a:extLst>
               <a:ext uri="{FF2B5EF4-FFF2-40B4-BE49-F238E27FC236}">
-                <a16:creationId xmlns:a16="http://schemas.microsoft.com/office/drawing/2014/main" xmlns="" id="{71DD5255-AE4D-4F8C-8442-E89ED7FB1400}"/>
+                <a16:creationId xmlns="" xmlns:a16="http://schemas.microsoft.com/office/drawing/2014/main" id="{71DD5255-AE4D-4F8C-8442-E89ED7FB1400}"/>
               </a:ext>
             </a:extLst>
           </p:cNvPr>
@@ -5983,7 +5864,7 @@
           <p:cNvPr id="5" name="Straight Connector 4">
             <a:extLst>
               <a:ext uri="{FF2B5EF4-FFF2-40B4-BE49-F238E27FC236}">
-                <a16:creationId xmlns:a16="http://schemas.microsoft.com/office/drawing/2014/main" xmlns="" id="{A487AE24-2B2E-4A94-81DC-5C11C11A0A01}"/>
+                <a16:creationId xmlns="" xmlns:a16="http://schemas.microsoft.com/office/drawing/2014/main" id="{A487AE24-2B2E-4A94-81DC-5C11C11A0A01}"/>
               </a:ext>
             </a:extLst>
           </p:cNvPr>
@@ -6019,7 +5900,7 @@
           <p:cNvPr id="9" name="Picture 8" descr="A close up of a logo&#10;&#10;Description generated with very high confidence">
             <a:extLst>
               <a:ext uri="{FF2B5EF4-FFF2-40B4-BE49-F238E27FC236}">
-                <a16:creationId xmlns:a16="http://schemas.microsoft.com/office/drawing/2014/main" xmlns="" id="{6E142685-9F6D-45FF-9CB8-1B195AF98E74}"/>
+                <a16:creationId xmlns="" xmlns:a16="http://schemas.microsoft.com/office/drawing/2014/main" id="{6E142685-9F6D-45FF-9CB8-1B195AF98E74}"/>
               </a:ext>
             </a:extLst>
           </p:cNvPr>
@@ -6054,7 +5935,7 @@
           <p:cNvPr id="10" name="TextBox 9">
             <a:extLst>
               <a:ext uri="{FF2B5EF4-FFF2-40B4-BE49-F238E27FC236}">
-                <a16:creationId xmlns:a16="http://schemas.microsoft.com/office/drawing/2014/main" xmlns="" id="{F6D31DDF-DF9C-4576-80EA-A654E4CD0E94}"/>
+                <a16:creationId xmlns="" xmlns:a16="http://schemas.microsoft.com/office/drawing/2014/main" id="{F6D31DDF-DF9C-4576-80EA-A654E4CD0E94}"/>
               </a:ext>
             </a:extLst>
           </p:cNvPr>
@@ -6323,7 +6204,7 @@
           <p:cNvPr id="12" name="Picture 2">
             <a:extLst>
               <a:ext uri="{FF2B5EF4-FFF2-40B4-BE49-F238E27FC236}">
-                <a16:creationId xmlns:a16="http://schemas.microsoft.com/office/drawing/2014/main" xmlns="" id="{2B37083F-1EFE-467E-A7EE-6246358BC86D}"/>
+                <a16:creationId xmlns="" xmlns:a16="http://schemas.microsoft.com/office/drawing/2014/main" id="{2B37083F-1EFE-467E-A7EE-6246358BC86D}"/>
               </a:ext>
             </a:extLst>
           </p:cNvPr>
@@ -6368,7 +6249,7 @@
           <p:cNvPr id="8" name="Picture 2" descr="See the source image">
             <a:extLst>
               <a:ext uri="{FF2B5EF4-FFF2-40B4-BE49-F238E27FC236}">
-                <a16:creationId xmlns:a16="http://schemas.microsoft.com/office/drawing/2014/main" xmlns="" id="{EE84E1ED-388C-423A-AC19-F78056C9AC89}"/>
+                <a16:creationId xmlns="" xmlns:a16="http://schemas.microsoft.com/office/drawing/2014/main" id="{EE84E1ED-388C-423A-AC19-F78056C9AC89}"/>
               </a:ext>
             </a:extLst>
           </p:cNvPr>
@@ -6452,7 +6333,7 @@
           <p:cNvPr id="2" name="Title 1">
             <a:extLst>
               <a:ext uri="{FF2B5EF4-FFF2-40B4-BE49-F238E27FC236}">
-                <a16:creationId xmlns:a16="http://schemas.microsoft.com/office/drawing/2014/main" xmlns="" id="{3E99E222-DE9B-47E7-9236-D0F54EE12B9A}"/>
+                <a16:creationId xmlns="" xmlns:a16="http://schemas.microsoft.com/office/drawing/2014/main" id="{3E99E222-DE9B-47E7-9236-D0F54EE12B9A}"/>
               </a:ext>
             </a:extLst>
           </p:cNvPr>
@@ -6491,7 +6372,7 @@
           <p:cNvPr id="3" name="Content Placeholder 2">
             <a:extLst>
               <a:ext uri="{FF2B5EF4-FFF2-40B4-BE49-F238E27FC236}">
-                <a16:creationId xmlns:a16="http://schemas.microsoft.com/office/drawing/2014/main" xmlns="" id="{CC8AAF96-7944-4DA9-ADEB-06847F494E0C}"/>
+                <a16:creationId xmlns="" xmlns:a16="http://schemas.microsoft.com/office/drawing/2014/main" id="{CC8AAF96-7944-4DA9-ADEB-06847F494E0C}"/>
               </a:ext>
             </a:extLst>
           </p:cNvPr>
@@ -6665,7 +6546,7 @@
           <p:cNvPr id="4" name="Slide Number Placeholder 3">
             <a:extLst>
               <a:ext uri="{FF2B5EF4-FFF2-40B4-BE49-F238E27FC236}">
-                <a16:creationId xmlns:a16="http://schemas.microsoft.com/office/drawing/2014/main" xmlns="" id="{04B652D9-FB5E-4057-8AFC-094DB6FB993E}"/>
+                <a16:creationId xmlns="" xmlns:a16="http://schemas.microsoft.com/office/drawing/2014/main" id="{04B652D9-FB5E-4057-8AFC-094DB6FB993E}"/>
               </a:ext>
             </a:extLst>
           </p:cNvPr>
@@ -6732,7 +6613,7 @@
           <p:cNvPr id="2" name="Title 1">
             <a:extLst>
               <a:ext uri="{FF2B5EF4-FFF2-40B4-BE49-F238E27FC236}">
-                <a16:creationId xmlns:a16="http://schemas.microsoft.com/office/drawing/2014/main" xmlns="" id="{5690C444-4E01-4656-B4DD-11253528945A}"/>
+                <a16:creationId xmlns="" xmlns:a16="http://schemas.microsoft.com/office/drawing/2014/main" id="{5690C444-4E01-4656-B4DD-11253528945A}"/>
               </a:ext>
             </a:extLst>
           </p:cNvPr>
@@ -6763,7 +6644,7 @@
           <p:cNvPr id="4" name="Slide Number Placeholder 3">
             <a:extLst>
               <a:ext uri="{FF2B5EF4-FFF2-40B4-BE49-F238E27FC236}">
-                <a16:creationId xmlns:a16="http://schemas.microsoft.com/office/drawing/2014/main" xmlns="" id="{07FB6821-9BFF-4412-B439-5B273E478E9F}"/>
+                <a16:creationId xmlns="" xmlns:a16="http://schemas.microsoft.com/office/drawing/2014/main" id="{07FB6821-9BFF-4412-B439-5B273E478E9F}"/>
               </a:ext>
             </a:extLst>
           </p:cNvPr>
@@ -6823,23 +6704,7 @@
             </a:r>
             <a:r>
               <a:rPr lang="de-DE" sz="2400"/>
-              <a:t>In: Jiaze Chen, Liangcai, </a:t>
-            </a:r>
-            <a:r>
-              <a:rPr lang="de-DE" sz="2400"/>
-              <a:t>GaoZhi </a:t>
-            </a:r>
-            <a:r>
-              <a:rPr lang="de-DE" sz="2400"/>
-              <a:t>Tang</a:t>
-            </a:r>
-            <a:r>
-              <a:rPr lang="de-DE" sz="2400"/>
-              <a:t>. </a:t>
-            </a:r>
-            <a:r>
-              <a:rPr lang="de-DE" sz="2400"/>
-              <a:t>CV-data-extraction [Github] in jejobueno</a:t>
+              <a:t>In: Jiaze Chen, Liangcai, GaoZhi Tang. CV-data-extraction [Github] in jejobueno</a:t>
             </a:r>
             <a:endParaRPr lang="en-US" sz="2400"/>
           </a:p>
@@ -6900,10 +6765,9 @@
           <a:lstStyle/>
           <a:p>
             <a:r>
-              <a:rPr lang="en-US" smtClean="0"/>
-              <a:t>Nghiên cứu liên quan</a:t>
-            </a:r>
-            <a:endParaRPr lang="en-US"/>
+              <a:rPr lang="en-US" b="1"/>
+              <a:t>Mô tả bài toán</a:t>
+            </a:r>
           </a:p>
         </p:txBody>
       </p:sp>
@@ -6919,14 +6783,119 @@
         </p:nvSpPr>
         <p:spPr/>
         <p:txBody>
-          <a:bodyPr/>
-          <a:lstStyle/>
-          <a:p>
-            <a:r>
-              <a:rPr lang="en-US" smtClean="0"/>
-              <a:t>Mô tả bài toán</a:t>
-            </a:r>
-            <a:endParaRPr lang="en-US"/>
+          <a:bodyPr>
+            <a:normAutofit/>
+          </a:bodyPr>
+          <a:lstStyle/>
+          <a:p>
+            <a:pPr marL="0" indent="0" algn="just">
+              <a:buNone/>
+            </a:pPr>
+            <a:r>
+              <a:rPr lang="vi-VN" sz="2000" smtClean="0"/>
+              <a:t>Thị </a:t>
+            </a:r>
+            <a:r>
+              <a:rPr lang="vi-VN" sz="2000"/>
+              <a:t>trường lao động cạnh tranh khiến doanh nghiệp nhận rất nhiều CV </a:t>
+            </a:r>
+            <a:r>
+              <a:rPr lang="vi-VN" sz="2000" b="1"/>
+              <a:t>phi cấu trúc, đa ngôn ngữ</a:t>
+            </a:r>
+            <a:r>
+              <a:rPr lang="vi-VN" sz="2000"/>
+              <a:t>, khó đánh giá thủ công, dễ tốn thời gian và thiên lệch. Đồ án xây dựng hệ thống </a:t>
+            </a:r>
+            <a:r>
+              <a:rPr lang="vi-VN" sz="2000" b="1"/>
+              <a:t>phân tích CV tự động</a:t>
+            </a:r>
+            <a:r>
+              <a:rPr lang="vi-VN" sz="2000"/>
+              <a:t>: dùng </a:t>
+            </a:r>
+            <a:r>
+              <a:rPr lang="vi-VN" sz="2000" b="1"/>
+              <a:t>NLP</a:t>
+            </a:r>
+            <a:r>
+              <a:rPr lang="vi-VN" sz="2000"/>
+              <a:t> (tokenization, stopword, NER) và </a:t>
+            </a:r>
+            <a:r>
+              <a:rPr lang="vi-VN" sz="2000" b="1"/>
+              <a:t>biểu diễn ngữ nghĩa</a:t>
+            </a:r>
+            <a:r>
+              <a:rPr lang="vi-VN" sz="2000"/>
+              <a:t> (TF-IDF/Cosine, </a:t>
+            </a:r>
+            <a:r>
+              <a:rPr lang="vi-VN" sz="2000" b="1"/>
+              <a:t>Sentence-BERT</a:t>
+            </a:r>
+            <a:r>
+              <a:rPr lang="vi-VN" sz="2000"/>
+              <a:t>) để trích xuất thông tin, đo </a:t>
+            </a:r>
+            <a:r>
+              <a:rPr lang="vi-VN" sz="2000" b="1"/>
+              <a:t>mức độ phù hợp CV–JD</a:t>
+            </a:r>
+            <a:r>
+              <a:rPr lang="vi-VN" sz="2000"/>
+              <a:t>, sau đó </a:t>
+            </a:r>
+            <a:r>
+              <a:rPr lang="vi-VN" sz="2000" b="1"/>
+              <a:t>phân loại</a:t>
+            </a:r>
+            <a:r>
+              <a:rPr lang="vi-VN" sz="2000"/>
+              <a:t> ứng viên (LR/RF/MLP) và </a:t>
+            </a:r>
+            <a:r>
+              <a:rPr lang="vi-VN" sz="2000" b="1"/>
+              <a:t>gợi ý câu hỏi phỏng vấn</a:t>
+            </a:r>
+            <a:r>
+              <a:rPr lang="vi-VN" sz="2000"/>
+              <a:t> theo kỹ năng/kinh nghiệm; đồng thời phát hiện </a:t>
+            </a:r>
+            <a:r>
+              <a:rPr lang="vi-VN" sz="2000" b="1"/>
+              <a:t>khoảng trống kỹ năng</a:t>
+            </a:r>
+            <a:r>
+              <a:rPr lang="vi-VN" sz="2000"/>
+              <a:t> để đề xuất bổ sung. Mục tiêu là </a:t>
+            </a:r>
+            <a:r>
+              <a:rPr lang="vi-VN" sz="2000" b="1"/>
+              <a:t>tăng tốc và nâng độ chính xác</a:t>
+            </a:r>
+            <a:r>
+              <a:rPr lang="vi-VN" sz="2000"/>
+              <a:t> sàng lọc, </a:t>
+            </a:r>
+            <a:r>
+              <a:rPr lang="vi-VN" sz="2000" b="1"/>
+              <a:t>giảm chủ quan</a:t>
+            </a:r>
+            <a:r>
+              <a:rPr lang="vi-VN" sz="2000"/>
+              <a:t>, và cung cấp </a:t>
+            </a:r>
+            <a:r>
+              <a:rPr lang="vi-VN" sz="2000" b="1"/>
+              <a:t>điểm số/đề xuất</a:t>
+            </a:r>
+            <a:r>
+              <a:rPr lang="vi-VN" sz="2000"/>
+              <a:t> hỗ trợ quyết định cho nhà tuyển dụng.</a:t>
+            </a:r>
+            <a:endParaRPr lang="en-US" sz="2000"/>
           </a:p>
         </p:txBody>
       </p:sp>
@@ -6996,7 +6965,7 @@
           <p:cNvPr id="2" name="Title 1">
             <a:extLst>
               <a:ext uri="{FF2B5EF4-FFF2-40B4-BE49-F238E27FC236}">
-                <a16:creationId xmlns:a16="http://schemas.microsoft.com/office/drawing/2014/main" xmlns="" id="{E9CE93C6-FC72-4847-89ED-A357240CA667}"/>
+                <a16:creationId xmlns="" xmlns:a16="http://schemas.microsoft.com/office/drawing/2014/main" id="{E9CE93C6-FC72-4847-89ED-A357240CA667}"/>
               </a:ext>
             </a:extLst>
           </p:cNvPr>
@@ -7033,7 +7002,7 @@
           <p:cNvPr id="4" name="Slide Number Placeholder 3">
             <a:extLst>
               <a:ext uri="{FF2B5EF4-FFF2-40B4-BE49-F238E27FC236}">
-                <a16:creationId xmlns:a16="http://schemas.microsoft.com/office/drawing/2014/main" xmlns="" id="{C2B4BF60-A7F3-491A-8562-B8E70C237870}"/>
+                <a16:creationId xmlns="" xmlns:a16="http://schemas.microsoft.com/office/drawing/2014/main" id="{C2B4BF60-A7F3-491A-8562-B8E70C237870}"/>
               </a:ext>
             </a:extLst>
           </p:cNvPr>
@@ -7069,7 +7038,7 @@
           <p:cNvPr id="8" name="Content Placeholder 7">
             <a:extLst>
               <a:ext uri="{FF2B5EF4-FFF2-40B4-BE49-F238E27FC236}">
-                <a16:creationId xmlns:a16="http://schemas.microsoft.com/office/drawing/2014/main" xmlns="" id="{6465E8EF-314E-9DD4-892E-556C6966F579}"/>
+                <a16:creationId xmlns="" xmlns:a16="http://schemas.microsoft.com/office/drawing/2014/main" id="{6465E8EF-314E-9DD4-892E-556C6966F579}"/>
               </a:ext>
             </a:extLst>
           </p:cNvPr>
@@ -7104,8 +7073,10 @@
       </p:sp>
       <p:pic>
         <p:nvPicPr>
-          <p:cNvPr id="7" name="Picture 6" descr="D:\AI-UIT\AI-UIT\Python_ML\BaoCao\3-1.png"/>
-          <p:cNvPicPr/>
+          <p:cNvPr id="3" name="Picture 2"/>
+          <p:cNvPicPr>
+            <a:picLocks noChangeAspect="1"/>
+          </p:cNvPicPr>
           <p:nvPr/>
         </p:nvPicPr>
         <p:blipFill>
@@ -7116,23 +7087,18 @@
               </a:ext>
             </a:extLst>
           </a:blip>
-          <a:srcRect/>
           <a:stretch>
             <a:fillRect/>
           </a:stretch>
         </p:blipFill>
-        <p:spPr bwMode="auto">
+        <p:spPr>
           <a:xfrm>
-            <a:off x="3448304" y="1112157"/>
-            <a:ext cx="4156607" cy="5279760"/>
+            <a:off x="3774186" y="978396"/>
+            <a:ext cx="4609832" cy="5352814"/>
           </a:xfrm>
           <a:prstGeom prst="rect">
             <a:avLst/>
           </a:prstGeom>
-          <a:noFill/>
-          <a:ln>
-            <a:noFill/>
-          </a:ln>
         </p:spPr>
       </p:pic>
     </p:spTree>
@@ -7250,14 +7216,7 @@
                 <a:latin typeface="Times New Roman" panose="02020603050405020304" pitchFamily="18" charset="0"/>
                 <a:cs typeface="Times New Roman" panose="02020603050405020304" pitchFamily="18" charset="0"/>
               </a:rPr>
-              <a:t>• Ngôn ngữ lập trình</a:t>
-            </a:r>
-            <a:r>
-              <a:rPr lang="vi-VN">
-                <a:latin typeface="Times New Roman" panose="02020603050405020304" pitchFamily="18" charset="0"/>
-                <a:cs typeface="Times New Roman" panose="02020603050405020304" pitchFamily="18" charset="0"/>
-              </a:rPr>
-              <a:t>: </a:t>
+              <a:t>• Ngôn ngữ lập trình: </a:t>
             </a:r>
             <a:r>
               <a:rPr lang="vi-VN" smtClean="0">
@@ -7284,14 +7243,7 @@
                 <a:latin typeface="Times New Roman" panose="02020603050405020304" pitchFamily="18" charset="0"/>
                 <a:cs typeface="Times New Roman" panose="02020603050405020304" pitchFamily="18" charset="0"/>
               </a:rPr>
-              <a:t>• Cấu hình máy thực </a:t>
-            </a:r>
-            <a:r>
-              <a:rPr lang="vi-VN">
-                <a:latin typeface="Times New Roman" panose="02020603050405020304" pitchFamily="18" charset="0"/>
-                <a:cs typeface="Times New Roman" panose="02020603050405020304" pitchFamily="18" charset="0"/>
-              </a:rPr>
-              <a:t>nghiệm</a:t>
+              <a:t>• Cấu hình máy thực nghiệm</a:t>
             </a:r>
             <a:r>
               <a:rPr lang="vi-VN" smtClean="0">
@@ -7423,82 +7375,21 @@
             </a:pPr>
             <a:r>
               <a:rPr lang="en-US" b="1"/>
-              <a:t>Dữ liệu </a:t>
-            </a:r>
-            <a:r>
-              <a:rPr lang="en-US" b="1"/>
-              <a:t>thực </a:t>
+              <a:t>Dữ liệu thực </a:t>
             </a:r>
             <a:r>
               <a:rPr lang="en-US" b="1" smtClean="0"/>
-              <a:t>nghiệm:</a:t>
-            </a:r>
-            <a:endParaRPr lang="en-US">
-              <a:latin typeface="Times New Roman" panose="02020603050405020304" pitchFamily="18" charset="0"/>
-              <a:cs typeface="Times New Roman" panose="02020603050405020304" pitchFamily="18" charset="0"/>
-            </a:endParaRPr>
-          </a:p>
-          <a:p>
-            <a:r>
-              <a:rPr lang="en-US">
-                <a:latin typeface="Times New Roman" panose="02020603050405020304" pitchFamily="18" charset="0"/>
-                <a:cs typeface="Times New Roman" panose="02020603050405020304" pitchFamily="18" charset="0"/>
-              </a:rPr>
-              <a:t>~</a:t>
-            </a:r>
-            <a:r>
-              <a:rPr lang="en-US">
-                <a:latin typeface="Times New Roman" panose="02020603050405020304" pitchFamily="18" charset="0"/>
-                <a:cs typeface="Times New Roman" panose="02020603050405020304" pitchFamily="18" charset="0"/>
-              </a:rPr>
-              <a:t>500 </a:t>
-            </a:r>
-            <a:r>
-              <a:rPr lang="en-US" smtClean="0">
-                <a:latin typeface="Times New Roman" panose="02020603050405020304" pitchFamily="18" charset="0"/>
-                <a:cs typeface="Times New Roman" panose="02020603050405020304" pitchFamily="18" charset="0"/>
-              </a:rPr>
-              <a:t>Resume in Kaggle</a:t>
-            </a:r>
-          </a:p>
-          <a:p>
-            <a:r>
-              <a:rPr lang="en-US" smtClean="0">
-                <a:latin typeface="Times New Roman" panose="02020603050405020304" pitchFamily="18" charset="0"/>
-                <a:cs typeface="Times New Roman" panose="02020603050405020304" pitchFamily="18" charset="0"/>
-              </a:rPr>
-              <a:t>~200 kỹ năng khác nhau (Python, Java, SQL, ML...)</a:t>
-            </a:r>
-          </a:p>
-          <a:p>
-            <a:r>
-              <a:rPr lang="en-US" smtClean="0">
-                <a:latin typeface="Times New Roman" panose="02020603050405020304" pitchFamily="18" charset="0"/>
-                <a:cs typeface="Times New Roman" panose="02020603050405020304" pitchFamily="18" charset="0"/>
-              </a:rPr>
-              <a:t>Ngôn </a:t>
-            </a:r>
-            <a:r>
-              <a:rPr lang="en-US">
-                <a:latin typeface="Times New Roman" panose="02020603050405020304" pitchFamily="18" charset="0"/>
-                <a:cs typeface="Times New Roman" panose="02020603050405020304" pitchFamily="18" charset="0"/>
-              </a:rPr>
-              <a:t>ngữ</a:t>
-            </a:r>
-            <a:r>
-              <a:rPr lang="en-US">
-                <a:latin typeface="Times New Roman" panose="02020603050405020304" pitchFamily="18" charset="0"/>
-                <a:cs typeface="Times New Roman" panose="02020603050405020304" pitchFamily="18" charset="0"/>
-              </a:rPr>
-              <a:t>: </a:t>
-            </a:r>
-            <a:r>
-              <a:rPr lang="en-US" smtClean="0">
-                <a:latin typeface="Times New Roman" panose="02020603050405020304" pitchFamily="18" charset="0"/>
-                <a:cs typeface="Times New Roman" panose="02020603050405020304" pitchFamily="18" charset="0"/>
-              </a:rPr>
-              <a:t>tiếng Anh</a:t>
-            </a:r>
+              <a:t>nghiệm</a:t>
+            </a:r>
+            <a:r>
+              <a:rPr lang="en-US" b="1" smtClean="0"/>
+              <a:t>:</a:t>
+            </a:r>
+          </a:p>
+          <a:p>
+            <a:pPr marL="0" indent="0">
+              <a:buNone/>
+            </a:pPr>
             <a:endParaRPr lang="en-US">
               <a:latin typeface="Times New Roman" panose="02020603050405020304" pitchFamily="18" charset="0"/>
               <a:cs typeface="Times New Roman" panose="02020603050405020304" pitchFamily="18" charset="0"/>
@@ -7536,6 +7427,214 @@
           </a:p>
         </p:txBody>
       </p:sp>
+      <p:graphicFrame>
+        <p:nvGraphicFramePr>
+          <p:cNvPr id="5" name="Table 4"/>
+          <p:cNvGraphicFramePr>
+            <a:graphicFrameLocks noGrp="1"/>
+          </p:cNvGraphicFramePr>
+          <p:nvPr>
+            <p:extLst>
+              <p:ext uri="{D42A27DB-BD31-4B8C-83A1-F6EECF244321}">
+                <p14:modId xmlns:p14="http://schemas.microsoft.com/office/powerpoint/2010/main" val="1802961261"/>
+              </p:ext>
+            </p:extLst>
+          </p:nvPr>
+        </p:nvGraphicFramePr>
+        <p:xfrm>
+          <a:off x="333632" y="1923524"/>
+          <a:ext cx="7886700" cy="2194560"/>
+        </p:xfrm>
+        <a:graphic>
+          <a:graphicData uri="http://schemas.openxmlformats.org/drawingml/2006/table">
+            <a:tbl>
+              <a:tblPr>
+                <a:tableStyleId>{8799B23B-EC83-4686-B30A-512413B5E67A}</a:tableStyleId>
+              </a:tblPr>
+              <a:tblGrid>
+                <a:gridCol w="1676237"/>
+                <a:gridCol w="2136618"/>
+                <a:gridCol w="1330860"/>
+                <a:gridCol w="2742985"/>
+              </a:tblGrid>
+              <a:tr h="0">
+                <a:tc>
+                  <a:txBody>
+                    <a:bodyPr/>
+                    <a:lstStyle/>
+                    <a:p>
+                      <a:r>
+                        <a:rPr lang="en-US"/>
+                        <a:t>Hạng mục</a:t>
+                      </a:r>
+                    </a:p>
+                  </a:txBody>
+                  <a:tcPr anchor="ctr"/>
+                </a:tc>
+                <a:tc>
+                  <a:txBody>
+                    <a:bodyPr/>
+                    <a:lstStyle/>
+                    <a:p>
+                      <a:r>
+                        <a:rPr lang="en-US"/>
+                        <a:t>Nguồn</a:t>
+                      </a:r>
+                    </a:p>
+                  </a:txBody>
+                  <a:tcPr anchor="ctr"/>
+                </a:tc>
+                <a:tc>
+                  <a:txBody>
+                    <a:bodyPr/>
+                    <a:lstStyle/>
+                    <a:p>
+                      <a:pPr algn="r"/>
+                      <a:r>
+                        <a:rPr lang="en-US"/>
+                        <a:t>Quy mô</a:t>
+                      </a:r>
+                    </a:p>
+                  </a:txBody>
+                  <a:tcPr anchor="ctr"/>
+                </a:tc>
+                <a:tc>
+                  <a:txBody>
+                    <a:bodyPr/>
+                    <a:lstStyle/>
+                    <a:p>
+                      <a:r>
+                        <a:rPr lang="en-US"/>
+                        <a:t>Ghi chú</a:t>
+                      </a:r>
+                    </a:p>
+                  </a:txBody>
+                  <a:tcPr anchor="ctr"/>
+                </a:tc>
+              </a:tr>
+              <a:tr h="0">
+                <a:tc>
+                  <a:txBody>
+                    <a:bodyPr/>
+                    <a:lstStyle/>
+                    <a:p>
+                      <a:r>
+                        <a:rPr lang="en-US"/>
+                        <a:t>Resume (CV)</a:t>
+                      </a:r>
+                    </a:p>
+                  </a:txBody>
+                  <a:tcPr anchor="ctr"/>
+                </a:tc>
+                <a:tc>
+                  <a:txBody>
+                    <a:bodyPr/>
+                    <a:lstStyle/>
+                    <a:p>
+                      <a:r>
+                        <a:rPr lang="en-US"/>
+                        <a:t>Kaggle</a:t>
+                      </a:r>
+                    </a:p>
+                  </a:txBody>
+                  <a:tcPr anchor="ctr"/>
+                </a:tc>
+                <a:tc>
+                  <a:txBody>
+                    <a:bodyPr/>
+                    <a:lstStyle/>
+                    <a:p>
+                      <a:pPr algn="r"/>
+                      <a:r>
+                        <a:rPr lang="en-US"/>
+                        <a:t>~1,000</a:t>
+                      </a:r>
+                    </a:p>
+                  </a:txBody>
+                  <a:tcPr anchor="ctr"/>
+                </a:tc>
+                <a:tc>
+                  <a:txBody>
+                    <a:bodyPr/>
+                    <a:lstStyle/>
+                    <a:p>
+                      <a:r>
+                        <a:rPr lang="en-US"/>
+                        <a:t>Dùng để huấn luyện/đánh giá pipeline trích xuất &amp; so khớp CV–JD</a:t>
+                      </a:r>
+                    </a:p>
+                  </a:txBody>
+                  <a:tcPr anchor="ctr"/>
+                </a:tc>
+              </a:tr>
+              <a:tr h="0">
+                <a:tc>
+                  <a:txBody>
+                    <a:bodyPr/>
+                    <a:lstStyle/>
+                    <a:p>
+                      <a:r>
+                        <a:rPr lang="en-US"/>
+                        <a:t>Kỹ năng (skills)</a:t>
+                      </a:r>
+                    </a:p>
+                  </a:txBody>
+                  <a:tcPr anchor="ctr"/>
+                </a:tc>
+                <a:tc>
+                  <a:txBody>
+                    <a:bodyPr/>
+                    <a:lstStyle/>
+                    <a:p>
+                      <a:r>
+                        <a:rPr lang="en-US"/>
+                        <a:t>Tập kỹ năng tổng </a:t>
+                      </a:r>
+                      <a:r>
+                        <a:rPr lang="en-US"/>
+                        <a:t>hợp </a:t>
+                      </a:r>
+                      <a:r>
+                        <a:rPr lang="en-US" smtClean="0"/>
+                        <a:t>skill2vec</a:t>
+                      </a:r>
+                      <a:endParaRPr lang="en-US"/>
+                    </a:p>
+                  </a:txBody>
+                  <a:tcPr anchor="ctr"/>
+                </a:tc>
+                <a:tc>
+                  <a:txBody>
+                    <a:bodyPr/>
+                    <a:lstStyle/>
+                    <a:p>
+                      <a:pPr algn="r"/>
+                      <a:r>
+                        <a:rPr lang="en-US"/>
+                        <a:t>~8,532</a:t>
+                      </a:r>
+                    </a:p>
+                  </a:txBody>
+                  <a:tcPr anchor="ctr"/>
+                </a:tc>
+                <a:tc>
+                  <a:txBody>
+                    <a:bodyPr/>
+                    <a:lstStyle/>
+                    <a:p>
+                      <a:r>
+                        <a:rPr lang="en-US"/>
+                        <a:t>Danh sách kỹ năng sau làm sạch; ví dụ: Python, Java, SQL, ML…</a:t>
+                      </a:r>
+                    </a:p>
+                  </a:txBody>
+                  <a:tcPr anchor="ctr"/>
+                </a:tc>
+              </a:tr>
+            </a:tbl>
+          </a:graphicData>
+        </a:graphic>
+      </p:graphicFrame>
     </p:spTree>
     <p:extLst>
       <p:ext uri="{BB962C8B-B14F-4D97-AF65-F5344CB8AC3E}">
@@ -7620,13 +7719,14 @@
               <a:buNone/>
             </a:pPr>
             <a:r>
-              <a:rPr lang="en-US" b="1"/>
-              <a:t>Cài đặt thu thập dữ liệu</a:t>
-            </a:r>
-            <a:r>
-              <a:rPr lang="en-US"/>
-              <a:t> </a:t>
-            </a:r>
+              <a:rPr lang="en-US" b="1" smtClean="0"/>
+              <a:t>Kết quả thực nghiệm:</a:t>
+            </a:r>
+          </a:p>
+          <a:p>
+            <a:pPr marL="0" indent="0">
+              <a:buNone/>
+            </a:pPr>
             <a:r>
               <a:rPr lang="en-US"/>
               <a:t/>
@@ -7671,10 +7771,40 @@
           </a:p>
         </p:txBody>
       </p:sp>
+      <p:pic>
+        <p:nvPicPr>
+          <p:cNvPr id="6" name="Picture 5"/>
+          <p:cNvPicPr>
+            <a:picLocks noChangeAspect="1"/>
+          </p:cNvPicPr>
+          <p:nvPr/>
+        </p:nvPicPr>
+        <p:blipFill>
+          <a:blip r:embed="rId2">
+            <a:extLst>
+              <a:ext uri="{28A0092B-C50C-407E-A947-70E740481C1C}">
+                <a14:useLocalDpi xmlns:a14="http://schemas.microsoft.com/office/drawing/2010/main" val="0"/>
+              </a:ext>
+            </a:extLst>
+          </a:blip>
+          <a:stretch>
+            <a:fillRect/>
+          </a:stretch>
+        </p:blipFill>
+        <p:spPr>
+          <a:xfrm>
+            <a:off x="3746" y="1762570"/>
+            <a:ext cx="9144000" cy="4537393"/>
+          </a:xfrm>
+          <a:prstGeom prst="rect">
+            <a:avLst/>
+          </a:prstGeom>
+        </p:spPr>
+      </p:pic>
     </p:spTree>
     <p:extLst>
       <p:ext uri="{BB962C8B-B14F-4D97-AF65-F5344CB8AC3E}">
-        <p14:creationId xmlns:p14="http://schemas.microsoft.com/office/powerpoint/2010/main" val="2406611066"/>
+        <p14:creationId xmlns:p14="http://schemas.microsoft.com/office/powerpoint/2010/main" val="4039619449"/>
       </p:ext>
     </p:extLst>
   </p:cSld>
@@ -7755,9 +7885,19 @@
               <a:buNone/>
             </a:pPr>
             <a:r>
-              <a:rPr lang="en-US" b="1" smtClean="0"/>
-              <a:t>Xử lý dữ liệu đầu vào</a:t>
-            </a:r>
+              <a:rPr lang="en-US" b="1"/>
+              <a:t>Cài đặt thu thập dữ liệu</a:t>
+            </a:r>
+            <a:r>
+              <a:rPr lang="en-US"/>
+              <a:t> </a:t>
+            </a:r>
+            <a:endParaRPr lang="en-US" smtClean="0"/>
+          </a:p>
+          <a:p>
+            <a:pPr marL="0" indent="0">
+              <a:buNone/>
+            </a:pPr>
             <a:r>
               <a:rPr lang="en-US"/>
               <a:t/>
@@ -7802,10 +7942,160 @@
           </a:p>
         </p:txBody>
       </p:sp>
+      <p:grpSp>
+        <p:nvGrpSpPr>
+          <p:cNvPr id="12" name="Group 11"/>
+          <p:cNvGrpSpPr/>
+          <p:nvPr/>
+        </p:nvGrpSpPr>
+        <p:grpSpPr>
+          <a:xfrm>
+            <a:off x="365392" y="1611422"/>
+            <a:ext cx="7000875" cy="1364539"/>
+            <a:chOff x="365392" y="1611422"/>
+            <a:chExt cx="7000875" cy="1364539"/>
+          </a:xfrm>
+        </p:grpSpPr>
+        <p:pic>
+          <p:nvPicPr>
+            <p:cNvPr id="5" name="Picture 4"/>
+            <p:cNvPicPr>
+              <a:picLocks noChangeAspect="1"/>
+            </p:cNvPicPr>
+            <p:nvPr/>
+          </p:nvPicPr>
+          <p:blipFill>
+            <a:blip r:embed="rId2"/>
+            <a:stretch>
+              <a:fillRect/>
+            </a:stretch>
+          </p:blipFill>
+          <p:spPr>
+            <a:xfrm>
+              <a:off x="365392" y="1611422"/>
+              <a:ext cx="7000875" cy="1009650"/>
+            </a:xfrm>
+            <a:prstGeom prst="rect">
+              <a:avLst/>
+            </a:prstGeom>
+          </p:spPr>
+        </p:pic>
+        <p:pic>
+          <p:nvPicPr>
+            <p:cNvPr id="8" name="Picture 7"/>
+            <p:cNvPicPr>
+              <a:picLocks noChangeAspect="1"/>
+            </p:cNvPicPr>
+            <p:nvPr/>
+          </p:nvPicPr>
+          <p:blipFill>
+            <a:blip r:embed="rId3"/>
+            <a:stretch>
+              <a:fillRect/>
+            </a:stretch>
+          </p:blipFill>
+          <p:spPr>
+            <a:xfrm>
+              <a:off x="365392" y="2737836"/>
+              <a:ext cx="5495925" cy="238125"/>
+            </a:xfrm>
+            <a:prstGeom prst="rect">
+              <a:avLst/>
+            </a:prstGeom>
+          </p:spPr>
+        </p:pic>
+      </p:grpSp>
+      <p:pic>
+        <p:nvPicPr>
+          <p:cNvPr id="9" name="Picture 8"/>
+          <p:cNvPicPr>
+            <a:picLocks noChangeAspect="1"/>
+          </p:cNvPicPr>
+          <p:nvPr/>
+        </p:nvPicPr>
+        <p:blipFill>
+          <a:blip r:embed="rId4"/>
+          <a:stretch>
+            <a:fillRect/>
+          </a:stretch>
+        </p:blipFill>
+        <p:spPr>
+          <a:xfrm>
+            <a:off x="384441" y="3129548"/>
+            <a:ext cx="5457825" cy="1552575"/>
+          </a:xfrm>
+          <a:prstGeom prst="rect">
+            <a:avLst/>
+          </a:prstGeom>
+        </p:spPr>
+      </p:pic>
+      <p:grpSp>
+        <p:nvGrpSpPr>
+          <p:cNvPr id="13" name="Group 12"/>
+          <p:cNvGrpSpPr/>
+          <p:nvPr/>
+        </p:nvGrpSpPr>
+        <p:grpSpPr>
+          <a:xfrm>
+            <a:off x="365392" y="4866031"/>
+            <a:ext cx="6191250" cy="1281588"/>
+            <a:chOff x="384441" y="5048696"/>
+            <a:chExt cx="6191250" cy="1281588"/>
+          </a:xfrm>
+        </p:grpSpPr>
+        <p:pic>
+          <p:nvPicPr>
+            <p:cNvPr id="10" name="Picture 9"/>
+            <p:cNvPicPr>
+              <a:picLocks noChangeAspect="1"/>
+            </p:cNvPicPr>
+            <p:nvPr/>
+          </p:nvPicPr>
+          <p:blipFill>
+            <a:blip r:embed="rId5"/>
+            <a:stretch>
+              <a:fillRect/>
+            </a:stretch>
+          </p:blipFill>
+          <p:spPr>
+            <a:xfrm>
+              <a:off x="384441" y="5048696"/>
+              <a:ext cx="6191250" cy="952500"/>
+            </a:xfrm>
+            <a:prstGeom prst="rect">
+              <a:avLst/>
+            </a:prstGeom>
+          </p:spPr>
+        </p:pic>
+        <p:pic>
+          <p:nvPicPr>
+            <p:cNvPr id="11" name="Picture 10"/>
+            <p:cNvPicPr>
+              <a:picLocks noChangeAspect="1"/>
+            </p:cNvPicPr>
+            <p:nvPr/>
+          </p:nvPicPr>
+          <p:blipFill>
+            <a:blip r:embed="rId6"/>
+            <a:stretch>
+              <a:fillRect/>
+            </a:stretch>
+          </p:blipFill>
+          <p:spPr>
+            <a:xfrm>
+              <a:off x="384441" y="6092159"/>
+              <a:ext cx="5962650" cy="238125"/>
+            </a:xfrm>
+            <a:prstGeom prst="rect">
+              <a:avLst/>
+            </a:prstGeom>
+          </p:spPr>
+        </p:pic>
+      </p:grpSp>
     </p:spTree>
     <p:extLst>
       <p:ext uri="{BB962C8B-B14F-4D97-AF65-F5344CB8AC3E}">
-        <p14:creationId xmlns:p14="http://schemas.microsoft.com/office/powerpoint/2010/main" val="4039619449"/>
+        <p14:creationId xmlns:p14="http://schemas.microsoft.com/office/powerpoint/2010/main" val="2406611066"/>
       </p:ext>
     </p:extLst>
   </p:cSld>
@@ -8379,11 +8669,12 @@
 </file>
 
 <file path=customXml/item1.xml><?xml version="1.0" encoding="utf-8"?>
-<p:properties xmlns:p="http://schemas.microsoft.com/office/2006/metadata/properties" xmlns:xsi="http://www.w3.org/2001/XMLSchema-instance" xmlns:pc="http://schemas.microsoft.com/office/infopath/2007/PartnerControls">
-  <documentManagement>
-    <_activity xmlns="a180626e-9302-4c14-8eea-5903bff38f28" xsi:nil="true"/>
-  </documentManagement>
-</p:properties>
+<?mso-contentType ?>
+<FormTemplates xmlns="http://schemas.microsoft.com/sharepoint/v3/contenttype/forms">
+  <Display>DocumentLibraryForm</Display>
+  <Edit>DocumentLibraryForm</Edit>
+  <New>DocumentLibraryForm</New>
+</FormTemplates>
 </file>
 
 <file path=customXml/item2.xml><?xml version="1.0" encoding="utf-8"?>
@@ -8608,27 +8899,17 @@
 </file>
 
 <file path=customXml/item3.xml><?xml version="1.0" encoding="utf-8"?>
-<?mso-contentType ?>
-<FormTemplates xmlns="http://schemas.microsoft.com/sharepoint/v3/contenttype/forms">
-  <Display>DocumentLibraryForm</Display>
-  <Edit>DocumentLibraryForm</Edit>
-  <New>DocumentLibraryForm</New>
-</FormTemplates>
+<p:properties xmlns:p="http://schemas.microsoft.com/office/2006/metadata/properties" xmlns:xsi="http://www.w3.org/2001/XMLSchema-instance" xmlns:pc="http://schemas.microsoft.com/office/infopath/2007/PartnerControls">
+  <documentManagement>
+    <_activity xmlns="a180626e-9302-4c14-8eea-5903bff38f28" xsi:nil="true"/>
+  </documentManagement>
+</p:properties>
 </file>
 
 <file path=customXml/itemProps1.xml><?xml version="1.0" encoding="utf-8"?>
-<ds:datastoreItem xmlns:ds="http://schemas.openxmlformats.org/officeDocument/2006/customXml" ds:itemID="{95C4C99A-1E0A-43B1-9616-0C2F59CB1038}">
+<ds:datastoreItem xmlns:ds="http://schemas.openxmlformats.org/officeDocument/2006/customXml" ds:itemID="{AF22FC6B-DD1F-45E2-9C9C-7BF43824AC6A}">
   <ds:schemaRefs>
-    <ds:schemaRef ds:uri="http://purl.org/dc/terms/"/>
-    <ds:schemaRef ds:uri="http://schemas.openxmlformats.org/package/2006/metadata/core-properties"/>
-    <ds:schemaRef ds:uri="http://purl.org/dc/dcmitype/"/>
-    <ds:schemaRef ds:uri="http://purl.org/dc/elements/1.1/"/>
-    <ds:schemaRef ds:uri="http://schemas.microsoft.com/office/2006/metadata/properties"/>
-    <ds:schemaRef ds:uri="http://www.w3.org/XML/1998/namespace"/>
-    <ds:schemaRef ds:uri="http://schemas.microsoft.com/office/2006/documentManagement/types"/>
-    <ds:schemaRef ds:uri="http://schemas.microsoft.com/office/infopath/2007/PartnerControls"/>
-    <ds:schemaRef ds:uri="70b93575-3f7a-4eb4-8cdb-228fc5024abe"/>
-    <ds:schemaRef ds:uri="a180626e-9302-4c14-8eea-5903bff38f28"/>
+    <ds:schemaRef ds:uri="http://schemas.microsoft.com/sharepoint/v3/contenttype/forms"/>
   </ds:schemaRefs>
 </ds:datastoreItem>
 </file>
@@ -8653,9 +8934,18 @@
 </file>
 
 <file path=customXml/itemProps3.xml><?xml version="1.0" encoding="utf-8"?>
-<ds:datastoreItem xmlns:ds="http://schemas.openxmlformats.org/officeDocument/2006/customXml" ds:itemID="{AF22FC6B-DD1F-45E2-9C9C-7BF43824AC6A}">
+<ds:datastoreItem xmlns:ds="http://schemas.openxmlformats.org/officeDocument/2006/customXml" ds:itemID="{95C4C99A-1E0A-43B1-9616-0C2F59CB1038}">
   <ds:schemaRefs>
-    <ds:schemaRef ds:uri="http://schemas.microsoft.com/sharepoint/v3/contenttype/forms"/>
+    <ds:schemaRef ds:uri="http://purl.org/dc/terms/"/>
+    <ds:schemaRef ds:uri="http://schemas.openxmlformats.org/package/2006/metadata/core-properties"/>
+    <ds:schemaRef ds:uri="http://purl.org/dc/dcmitype/"/>
+    <ds:schemaRef ds:uri="http://purl.org/dc/elements/1.1/"/>
+    <ds:schemaRef ds:uri="http://schemas.microsoft.com/office/2006/metadata/properties"/>
+    <ds:schemaRef ds:uri="http://www.w3.org/XML/1998/namespace"/>
+    <ds:schemaRef ds:uri="http://schemas.microsoft.com/office/2006/documentManagement/types"/>
+    <ds:schemaRef ds:uri="http://schemas.microsoft.com/office/infopath/2007/PartnerControls"/>
+    <ds:schemaRef ds:uri="70b93575-3f7a-4eb4-8cdb-228fc5024abe"/>
+    <ds:schemaRef ds:uri="a180626e-9302-4c14-8eea-5903bff38f28"/>
   </ds:schemaRefs>
 </ds:datastoreItem>
 </file>
</xml_diff>